<commit_message>
Presentation v2.0 et images
</commit_message>
<xml_diff>
--- a/Présentation de mi-projet/Outils de visualisation de capture réseau.pptx
+++ b/Présentation de mi-projet/Outils de visualisation de capture réseau.pptx
@@ -5,7 +5,7 @@
     <p:sldMasterId id="2147483648" r:id="rId1"/>
   </p:sldMasterIdLst>
   <p:notesMasterIdLst>
-    <p:notesMasterId r:id="rId16"/>
+    <p:notesMasterId r:id="rId19"/>
   </p:notesMasterIdLst>
   <p:sldIdLst>
     <p:sldId id="256" r:id="rId2"/>
@@ -14,14 +14,17 @@
     <p:sldId id="257" r:id="rId5"/>
     <p:sldId id="259" r:id="rId6"/>
     <p:sldId id="258" r:id="rId7"/>
-    <p:sldId id="261" r:id="rId8"/>
-    <p:sldId id="267" r:id="rId9"/>
-    <p:sldId id="268" r:id="rId10"/>
-    <p:sldId id="271" r:id="rId11"/>
-    <p:sldId id="270" r:id="rId12"/>
-    <p:sldId id="263" r:id="rId13"/>
-    <p:sldId id="272" r:id="rId14"/>
-    <p:sldId id="273" r:id="rId15"/>
+    <p:sldId id="274" r:id="rId8"/>
+    <p:sldId id="275" r:id="rId9"/>
+    <p:sldId id="278" r:id="rId10"/>
+    <p:sldId id="276" r:id="rId11"/>
+    <p:sldId id="277" r:id="rId12"/>
+    <p:sldId id="271" r:id="rId13"/>
+    <p:sldId id="261" r:id="rId14"/>
+    <p:sldId id="267" r:id="rId15"/>
+    <p:sldId id="263" r:id="rId16"/>
+    <p:sldId id="272" r:id="rId17"/>
+    <p:sldId id="273" r:id="rId18"/>
   </p:sldIdLst>
   <p:sldSz cx="12192000" cy="6858000"/>
   <p:notesSz cx="6858000" cy="9144000"/>
@@ -210,7 +213,7 @@
           <a:p>
             <a:fld id="{29C83E6C-40B6-4DF7-B2E2-F703E66700A2}" type="datetimeFigureOut">
               <a:rPr lang="fr-FR" smtClean="0"/>
-              <a:t>15/12/2015</a:t>
+              <a:t>16/12/2015</a:t>
             </a:fld>
             <a:endParaRPr lang="fr-FR"/>
           </a:p>
@@ -627,7 +630,7 @@
           <a:p>
             <a:fld id="{6D9ED5D0-C663-444C-AB50-D90E1FD41D05}" type="slidenum">
               <a:rPr lang="fr-FR" smtClean="0"/>
-              <a:t>14</a:t>
+              <a:t>17</a:t>
             </a:fld>
             <a:endParaRPr lang="fr-FR"/>
           </a:p>
@@ -1148,7 +1151,7 @@
           <a:p>
             <a:fld id="{00E9EAD4-C926-4B8B-A4F7-4BE6E421E4C2}" type="datetime1">
               <a:rPr lang="en-US" smtClean="0"/>
-              <a:t>12/15/2015</a:t>
+              <a:t>12/16/2015</a:t>
             </a:fld>
             <a:endParaRPr lang="en-US" dirty="0"/>
           </a:p>
@@ -1444,7 +1447,7 @@
           <a:p>
             <a:fld id="{581B4B38-A6C9-45D6-8314-6945096249FD}" type="datetime1">
               <a:rPr lang="en-US" smtClean="0"/>
-              <a:t>12/15/2015</a:t>
+              <a:t>12/16/2015</a:t>
             </a:fld>
             <a:endParaRPr lang="en-US" dirty="0"/>
           </a:p>
@@ -1692,7 +1695,7 @@
           <a:p>
             <a:fld id="{5BABE05B-B8E7-4D72-BABE-A32F6DA188AB}" type="datetime1">
               <a:rPr lang="en-US" smtClean="0"/>
-              <a:t>12/15/2015</a:t>
+              <a:t>12/16/2015</a:t>
             </a:fld>
             <a:endParaRPr lang="en-US" dirty="0"/>
           </a:p>
@@ -2232,7 +2235,7 @@
           <a:p>
             <a:fld id="{F7B97766-5341-4C95-85B2-713CBFF7EAF3}" type="datetime1">
               <a:rPr lang="en-US" smtClean="0"/>
-              <a:t>12/15/2015</a:t>
+              <a:t>12/16/2015</a:t>
             </a:fld>
             <a:endParaRPr lang="en-US" dirty="0"/>
           </a:p>
@@ -2480,7 +2483,7 @@
           <a:p>
             <a:fld id="{39528A74-A6C0-4C95-8A92-C7FF16AF47CF}" type="datetime1">
               <a:rPr lang="en-US" smtClean="0"/>
-              <a:t>12/15/2015</a:t>
+              <a:t>12/16/2015</a:t>
             </a:fld>
             <a:endParaRPr lang="en-US" dirty="0"/>
           </a:p>
@@ -3012,7 +3015,7 @@
           <a:p>
             <a:fld id="{EDF64AB2-57DD-4E25-9E1B-38B44ACB1436}" type="datetime1">
               <a:rPr lang="en-US" smtClean="0"/>
-              <a:t>12/15/2015</a:t>
+              <a:t>12/16/2015</a:t>
             </a:fld>
             <a:endParaRPr lang="en-US" dirty="0"/>
           </a:p>
@@ -3309,7 +3312,7 @@
           <a:p>
             <a:fld id="{C901E06B-4A2E-47C3-B359-8555ED12CE45}" type="datetime1">
               <a:rPr lang="en-US" smtClean="0"/>
-              <a:t>12/15/2015</a:t>
+              <a:t>12/16/2015</a:t>
             </a:fld>
             <a:endParaRPr lang="en-US" dirty="0"/>
           </a:p>
@@ -3483,7 +3486,7 @@
           <a:p>
             <a:fld id="{07D15D2D-74CE-4639-96E1-F567065FF664}" type="datetime1">
               <a:rPr lang="en-US" smtClean="0"/>
-              <a:t>12/15/2015</a:t>
+              <a:t>12/16/2015</a:t>
             </a:fld>
             <a:endParaRPr lang="en-US" dirty="0"/>
           </a:p>
@@ -3663,7 +3666,7 @@
           <a:p>
             <a:fld id="{2939545B-2DE5-475A-8506-74CA7DE21467}" type="datetime1">
               <a:rPr lang="en-US" smtClean="0"/>
-              <a:t>12/15/2015</a:t>
+              <a:t>12/16/2015</a:t>
             </a:fld>
             <a:endParaRPr lang="en-US" dirty="0"/>
           </a:p>
@@ -3833,7 +3836,7 @@
           <a:p>
             <a:fld id="{1E9F4905-8AEE-49DF-9472-70497A0E91B4}" type="datetime1">
               <a:rPr lang="en-US" smtClean="0"/>
-              <a:t>12/15/2015</a:t>
+              <a:t>12/16/2015</a:t>
             </a:fld>
             <a:endParaRPr lang="en-US" dirty="0"/>
           </a:p>
@@ -4084,7 +4087,7 @@
           <a:p>
             <a:fld id="{19B510B9-D177-4200-8179-CA39B6DC0518}" type="datetime1">
               <a:rPr lang="en-US" smtClean="0"/>
-              <a:t>12/15/2015</a:t>
+              <a:t>12/16/2015</a:t>
             </a:fld>
             <a:endParaRPr lang="en-US" dirty="0"/>
           </a:p>
@@ -4381,7 +4384,7 @@
           <a:p>
             <a:fld id="{AB1F93A1-0D33-4A63-91AD-1E92492AD5CC}" type="datetime1">
               <a:rPr lang="en-US" smtClean="0"/>
-              <a:t>12/15/2015</a:t>
+              <a:t>12/16/2015</a:t>
             </a:fld>
             <a:endParaRPr lang="en-US" dirty="0"/>
           </a:p>
@@ -4823,7 +4826,7 @@
           <a:p>
             <a:fld id="{ABBCD0D1-17A5-4ADF-AA9E-3FCA4AE0C985}" type="datetime1">
               <a:rPr lang="en-US" smtClean="0"/>
-              <a:t>12/15/2015</a:t>
+              <a:t>12/16/2015</a:t>
             </a:fld>
             <a:endParaRPr lang="en-US" dirty="0"/>
           </a:p>
@@ -4941,7 +4944,7 @@
           <a:p>
             <a:fld id="{FB107B98-6743-446F-8AEA-6064604AFE0E}" type="datetime1">
               <a:rPr lang="en-US" smtClean="0"/>
-              <a:t>12/15/2015</a:t>
+              <a:t>12/16/2015</a:t>
             </a:fld>
             <a:endParaRPr lang="en-US" dirty="0"/>
           </a:p>
@@ -5036,7 +5039,7 @@
           <a:p>
             <a:fld id="{191E4130-0D16-4618-B141-0C7AE836E344}" type="datetime1">
               <a:rPr lang="en-US" smtClean="0"/>
-              <a:t>12/15/2015</a:t>
+              <a:t>12/16/2015</a:t>
             </a:fld>
             <a:endParaRPr lang="en-US" dirty="0"/>
           </a:p>
@@ -5319,7 +5322,7 @@
           <a:p>
             <a:fld id="{CC5F74CF-0229-417B-9F56-ED832D6E9968}" type="datetime1">
               <a:rPr lang="en-US" smtClean="0"/>
-              <a:t>12/15/2015</a:t>
+              <a:t>12/16/2015</a:t>
             </a:fld>
             <a:endParaRPr lang="en-US" dirty="0"/>
           </a:p>
@@ -5610,7 +5613,7 @@
           <a:p>
             <a:fld id="{CE5D3A7C-2C1D-438F-8A5C-BE43AA35AFA1}" type="datetime1">
               <a:rPr lang="en-US" smtClean="0"/>
-              <a:t>12/15/2015</a:t>
+              <a:t>12/16/2015</a:t>
             </a:fld>
             <a:endParaRPr lang="en-US" dirty="0"/>
           </a:p>
@@ -6140,7 +6143,7 @@
           <a:p>
             <a:fld id="{7E2C03DA-6DD8-4EE6-98D5-5AEE914510C6}" type="datetime1">
               <a:rPr lang="en-US" smtClean="0"/>
-              <a:t>12/15/2015</a:t>
+              <a:t>12/16/2015</a:t>
             </a:fld>
             <a:endParaRPr lang="en-US" dirty="0"/>
           </a:p>
@@ -6824,6 +6827,399 @@
           <a:lstStyle/>
           <a:p>
             <a:r>
+              <a:rPr lang="fr-FR" dirty="0"/>
+              <a:t>Etat de l’art -</a:t>
+            </a:r>
+            <a:r>
+              <a:rPr lang="fr-FR" dirty="0" smtClean="0"/>
+              <a:t> Visualisation</a:t>
+            </a:r>
+            <a:endParaRPr lang="fr-FR" dirty="0"/>
+          </a:p>
+        </p:txBody>
+      </p:sp>
+      <p:pic>
+        <p:nvPicPr>
+          <p:cNvPr id="6" name="Espace réservé du contenu 5"/>
+          <p:cNvPicPr>
+            <a:picLocks noGrp="1" noChangeAspect="1"/>
+          </p:cNvPicPr>
+          <p:nvPr>
+            <p:ph idx="1"/>
+          </p:nvPr>
+        </p:nvPicPr>
+        <p:blipFill rotWithShape="1">
+          <a:blip r:embed="rId2">
+            <a:extLst>
+              <a:ext uri="{28A0092B-C50C-407E-A947-70E740481C1C}">
+                <a14:useLocalDpi xmlns:a14="http://schemas.microsoft.com/office/drawing/2010/main" val="0"/>
+              </a:ext>
+            </a:extLst>
+          </a:blip>
+          <a:srcRect r="47215"/>
+          <a:stretch/>
+        </p:blipFill>
+        <p:spPr>
+          <a:xfrm>
+            <a:off x="6722074" y="2438399"/>
+            <a:ext cx="2934382" cy="3124200"/>
+          </a:xfrm>
+        </p:spPr>
+      </p:pic>
+      <p:sp>
+        <p:nvSpPr>
+          <p:cNvPr id="4" name="Espace réservé du pied de page 3"/>
+          <p:cNvSpPr>
+            <a:spLocks noGrp="1"/>
+          </p:cNvSpPr>
+          <p:nvPr>
+            <p:ph type="ftr" sz="quarter" idx="11"/>
+          </p:nvPr>
+        </p:nvSpPr>
+        <p:spPr/>
+        <p:txBody>
+          <a:bodyPr/>
+          <a:lstStyle/>
+          <a:p>
+            <a:r>
+              <a:rPr lang="en-US" smtClean="0"/>
+              <a:t>Visualisation de capture réseau</a:t>
+            </a:r>
+            <a:endParaRPr lang="en-US" dirty="0"/>
+          </a:p>
+        </p:txBody>
+      </p:sp>
+      <p:sp>
+        <p:nvSpPr>
+          <p:cNvPr id="5" name="Espace réservé du numéro de diapositive 4"/>
+          <p:cNvSpPr>
+            <a:spLocks noGrp="1"/>
+          </p:cNvSpPr>
+          <p:nvPr>
+            <p:ph type="sldNum" sz="quarter" idx="12"/>
+          </p:nvPr>
+        </p:nvSpPr>
+        <p:spPr/>
+        <p:txBody>
+          <a:bodyPr/>
+          <a:lstStyle/>
+          <a:p>
+            <a:fld id="{D57F1E4F-1CFF-5643-939E-217C01CDF565}" type="slidenum">
+              <a:rPr lang="en-US" smtClean="0"/>
+              <a:pPr/>
+              <a:t>10</a:t>
+            </a:fld>
+            <a:endParaRPr lang="en-US" dirty="0"/>
+          </a:p>
+        </p:txBody>
+      </p:sp>
+      <p:sp>
+        <p:nvSpPr>
+          <p:cNvPr id="7" name="ZoneTexte 6"/>
+          <p:cNvSpPr txBox="1"/>
+          <p:nvPr/>
+        </p:nvSpPr>
+        <p:spPr>
+          <a:xfrm>
+            <a:off x="2572279" y="3261835"/>
+            <a:ext cx="4141136" cy="1477328"/>
+          </a:xfrm>
+          <a:prstGeom prst="rect">
+            <a:avLst/>
+          </a:prstGeom>
+          <a:noFill/>
+        </p:spPr>
+        <p:txBody>
+          <a:bodyPr wrap="square" rtlCol="0">
+            <a:spAutoFit/>
+          </a:bodyPr>
+          <a:lstStyle/>
+          <a:p>
+            <a:pPr marL="285750" indent="-285750">
+              <a:buFontTx/>
+              <a:buChar char="-"/>
+            </a:pPr>
+            <a:r>
+              <a:rPr lang="fr-FR" dirty="0" smtClean="0"/>
+              <a:t>Carte proportionnelle</a:t>
+            </a:r>
+          </a:p>
+          <a:p>
+            <a:pPr marL="285750" indent="-285750">
+              <a:buFontTx/>
+              <a:buChar char="-"/>
+            </a:pPr>
+            <a:endParaRPr lang="fr-FR" dirty="0"/>
+          </a:p>
+          <a:p>
+            <a:pPr marL="285750" indent="-285750">
+              <a:buFontTx/>
+              <a:buChar char="-"/>
+            </a:pPr>
+            <a:r>
+              <a:rPr lang="fr-FR" dirty="0" smtClean="0"/>
+              <a:t>Un grand carré =&gt; une machine</a:t>
+            </a:r>
+          </a:p>
+          <a:p>
+            <a:pPr marL="285750" indent="-285750">
+              <a:buFontTx/>
+              <a:buChar char="-"/>
+            </a:pPr>
+            <a:endParaRPr lang="fr-FR" dirty="0"/>
+          </a:p>
+          <a:p>
+            <a:pPr marL="285750" indent="-285750">
+              <a:buFontTx/>
+              <a:buChar char="-"/>
+            </a:pPr>
+            <a:r>
+              <a:rPr lang="fr-FR" dirty="0" smtClean="0"/>
+              <a:t>Un petit carré =&gt; un protocole</a:t>
+            </a:r>
+            <a:endParaRPr lang="fr-FR" dirty="0"/>
+          </a:p>
+        </p:txBody>
+      </p:sp>
+    </p:spTree>
+    <p:extLst>
+      <p:ext uri="{BB962C8B-B14F-4D97-AF65-F5344CB8AC3E}">
+        <p14:creationId xmlns:p14="http://schemas.microsoft.com/office/powerpoint/2010/main" val="2529131256"/>
+      </p:ext>
+    </p:extLst>
+  </p:cSld>
+  <p:clrMapOvr>
+    <a:masterClrMapping/>
+  </p:clrMapOvr>
+  <p:timing>
+    <p:tnLst>
+      <p:par>
+        <p:cTn id="1" dur="indefinite" restart="never" nodeType="tmRoot"/>
+      </p:par>
+    </p:tnLst>
+  </p:timing>
+</p:sld>
+</file>
+
+<file path=ppt/slides/slide11.xml><?xml version="1.0" encoding="utf-8"?>
+<p:sld xmlns:a="http://schemas.openxmlformats.org/drawingml/2006/main" xmlns:r="http://schemas.openxmlformats.org/officeDocument/2006/relationships" xmlns:p="http://schemas.openxmlformats.org/presentationml/2006/main">
+  <p:cSld>
+    <p:spTree>
+      <p:nvGrpSpPr>
+        <p:cNvPr id="1" name=""/>
+        <p:cNvGrpSpPr/>
+        <p:nvPr/>
+      </p:nvGrpSpPr>
+      <p:grpSpPr>
+        <a:xfrm>
+          <a:off x="0" y="0"/>
+          <a:ext cx="0" cy="0"/>
+          <a:chOff x="0" y="0"/>
+          <a:chExt cx="0" cy="0"/>
+        </a:xfrm>
+      </p:grpSpPr>
+      <p:sp>
+        <p:nvSpPr>
+          <p:cNvPr id="2" name="Titre 1"/>
+          <p:cNvSpPr>
+            <a:spLocks noGrp="1"/>
+          </p:cNvSpPr>
+          <p:nvPr>
+            <p:ph type="title"/>
+          </p:nvPr>
+        </p:nvSpPr>
+        <p:spPr/>
+        <p:txBody>
+          <a:bodyPr/>
+          <a:lstStyle/>
+          <a:p>
+            <a:r>
+              <a:rPr lang="fr-FR" dirty="0"/>
+              <a:t>Etat de l’art -</a:t>
+            </a:r>
+            <a:r>
+              <a:rPr lang="fr-FR" dirty="0" smtClean="0"/>
+              <a:t> Visualisation</a:t>
+            </a:r>
+            <a:endParaRPr lang="fr-FR" dirty="0"/>
+          </a:p>
+        </p:txBody>
+      </p:sp>
+      <p:pic>
+        <p:nvPicPr>
+          <p:cNvPr id="6" name="Espace réservé du contenu 5"/>
+          <p:cNvPicPr>
+            <a:picLocks noGrp="1" noChangeAspect="1"/>
+          </p:cNvPicPr>
+          <p:nvPr>
+            <p:ph idx="1"/>
+          </p:nvPr>
+        </p:nvPicPr>
+        <p:blipFill>
+          <a:blip r:embed="rId2">
+            <a:extLst>
+              <a:ext uri="{28A0092B-C50C-407E-A947-70E740481C1C}">
+                <a14:useLocalDpi xmlns:a14="http://schemas.microsoft.com/office/drawing/2010/main" val="0"/>
+              </a:ext>
+            </a:extLst>
+          </a:blip>
+          <a:stretch>
+            <a:fillRect/>
+          </a:stretch>
+        </p:blipFill>
+        <p:spPr>
+          <a:xfrm>
+            <a:off x="7141324" y="3208204"/>
+            <a:ext cx="3810532" cy="1905266"/>
+          </a:xfrm>
+        </p:spPr>
+      </p:pic>
+      <p:sp>
+        <p:nvSpPr>
+          <p:cNvPr id="4" name="Espace réservé du pied de page 3"/>
+          <p:cNvSpPr>
+            <a:spLocks noGrp="1"/>
+          </p:cNvSpPr>
+          <p:nvPr>
+            <p:ph type="ftr" sz="quarter" idx="11"/>
+          </p:nvPr>
+        </p:nvSpPr>
+        <p:spPr/>
+        <p:txBody>
+          <a:bodyPr/>
+          <a:lstStyle/>
+          <a:p>
+            <a:r>
+              <a:rPr lang="en-US" smtClean="0"/>
+              <a:t>Visualisation de capture réseau</a:t>
+            </a:r>
+            <a:endParaRPr lang="en-US" dirty="0"/>
+          </a:p>
+        </p:txBody>
+      </p:sp>
+      <p:sp>
+        <p:nvSpPr>
+          <p:cNvPr id="5" name="Espace réservé du numéro de diapositive 4"/>
+          <p:cNvSpPr>
+            <a:spLocks noGrp="1"/>
+          </p:cNvSpPr>
+          <p:nvPr>
+            <p:ph type="sldNum" sz="quarter" idx="12"/>
+          </p:nvPr>
+        </p:nvSpPr>
+        <p:spPr/>
+        <p:txBody>
+          <a:bodyPr/>
+          <a:lstStyle/>
+          <a:p>
+            <a:fld id="{D57F1E4F-1CFF-5643-939E-217C01CDF565}" type="slidenum">
+              <a:rPr lang="en-US" smtClean="0"/>
+              <a:pPr/>
+              <a:t>11</a:t>
+            </a:fld>
+            <a:endParaRPr lang="en-US" dirty="0"/>
+          </a:p>
+        </p:txBody>
+      </p:sp>
+      <p:sp>
+        <p:nvSpPr>
+          <p:cNvPr id="7" name="ZoneTexte 6"/>
+          <p:cNvSpPr txBox="1"/>
+          <p:nvPr/>
+        </p:nvSpPr>
+        <p:spPr>
+          <a:xfrm>
+            <a:off x="2572279" y="3691100"/>
+            <a:ext cx="4445936" cy="923330"/>
+          </a:xfrm>
+          <a:prstGeom prst="rect">
+            <a:avLst/>
+          </a:prstGeom>
+          <a:noFill/>
+        </p:spPr>
+        <p:txBody>
+          <a:bodyPr wrap="square" rtlCol="0">
+            <a:spAutoFit/>
+          </a:bodyPr>
+          <a:lstStyle/>
+          <a:p>
+            <a:r>
+              <a:rPr lang="fr-FR" dirty="0" smtClean="0"/>
+              <a:t>Carte de chaleur</a:t>
+            </a:r>
+          </a:p>
+          <a:p>
+            <a:pPr marL="285750" indent="-285750">
+              <a:buFontTx/>
+              <a:buChar char="-"/>
+            </a:pPr>
+            <a:endParaRPr lang="fr-FR" dirty="0"/>
+          </a:p>
+          <a:p>
+            <a:pPr marL="285750" indent="-285750">
+              <a:buFontTx/>
+              <a:buChar char="-"/>
+            </a:pPr>
+            <a:r>
+              <a:rPr lang="fr-FR" dirty="0" smtClean="0"/>
+              <a:t>Pourrait être superposé à un autre graphe</a:t>
+            </a:r>
+          </a:p>
+        </p:txBody>
+      </p:sp>
+    </p:spTree>
+    <p:extLst>
+      <p:ext uri="{BB962C8B-B14F-4D97-AF65-F5344CB8AC3E}">
+        <p14:creationId xmlns:p14="http://schemas.microsoft.com/office/powerpoint/2010/main" val="1600451358"/>
+      </p:ext>
+    </p:extLst>
+  </p:cSld>
+  <p:clrMapOvr>
+    <a:masterClrMapping/>
+  </p:clrMapOvr>
+  <p:timing>
+    <p:tnLst>
+      <p:par>
+        <p:cTn id="1" dur="indefinite" restart="never" nodeType="tmRoot"/>
+      </p:par>
+    </p:tnLst>
+  </p:timing>
+</p:sld>
+</file>
+
+<file path=ppt/slides/slide12.xml><?xml version="1.0" encoding="utf-8"?>
+<p:sld xmlns:a="http://schemas.openxmlformats.org/drawingml/2006/main" xmlns:r="http://schemas.openxmlformats.org/officeDocument/2006/relationships" xmlns:p="http://schemas.openxmlformats.org/presentationml/2006/main">
+  <p:cSld>
+    <p:spTree>
+      <p:nvGrpSpPr>
+        <p:cNvPr id="1" name=""/>
+        <p:cNvGrpSpPr/>
+        <p:nvPr/>
+      </p:nvGrpSpPr>
+      <p:grpSpPr>
+        <a:xfrm>
+          <a:off x="0" y="0"/>
+          <a:ext cx="0" cy="0"/>
+          <a:chOff x="0" y="0"/>
+          <a:chExt cx="0" cy="0"/>
+        </a:xfrm>
+      </p:grpSpPr>
+      <p:sp>
+        <p:nvSpPr>
+          <p:cNvPr id="2" name="Titre 1"/>
+          <p:cNvSpPr>
+            <a:spLocks noGrp="1"/>
+          </p:cNvSpPr>
+          <p:nvPr>
+            <p:ph type="title"/>
+          </p:nvPr>
+        </p:nvSpPr>
+        <p:spPr/>
+        <p:txBody>
+          <a:bodyPr/>
+          <a:lstStyle/>
+          <a:p>
+            <a:r>
               <a:rPr lang="fr-FR" dirty="0" smtClean="0"/>
               <a:t>Etat de l’art - </a:t>
             </a:r>
@@ -6916,7 +7312,7 @@
             <a:fld id="{D57F1E4F-1CFF-5643-939E-217C01CDF565}" type="slidenum">
               <a:rPr lang="en-US" smtClean="0"/>
               <a:pPr/>
-              <a:t>10</a:t>
+              <a:t>12</a:t>
             </a:fld>
             <a:endParaRPr lang="en-US" dirty="0"/>
           </a:p>
@@ -7209,570 +7605,13 @@
   <p:clrMapOvr>
     <a:masterClrMapping/>
   </p:clrMapOvr>
-</p:sld>
-</file>
-
-<file path=ppt/slides/slide11.xml><?xml version="1.0" encoding="utf-8"?>
-<p:sld xmlns:a="http://schemas.openxmlformats.org/drawingml/2006/main" xmlns:r="http://schemas.openxmlformats.org/officeDocument/2006/relationships" xmlns:p="http://schemas.openxmlformats.org/presentationml/2006/main">
-  <p:cSld>
-    <p:spTree>
-      <p:nvGrpSpPr>
-        <p:cNvPr id="1" name=""/>
-        <p:cNvGrpSpPr/>
-        <p:nvPr/>
-      </p:nvGrpSpPr>
-      <p:grpSpPr>
-        <a:xfrm>
-          <a:off x="0" y="0"/>
-          <a:ext cx="0" cy="0"/>
-          <a:chOff x="0" y="0"/>
-          <a:chExt cx="0" cy="0"/>
-        </a:xfrm>
-      </p:grpSpPr>
-      <p:sp>
-        <p:nvSpPr>
-          <p:cNvPr id="2" name="Titre 1"/>
-          <p:cNvSpPr>
-            <a:spLocks noGrp="1"/>
-          </p:cNvSpPr>
-          <p:nvPr>
-            <p:ph type="title"/>
-          </p:nvPr>
-        </p:nvSpPr>
-        <p:spPr/>
-        <p:txBody>
-          <a:bodyPr/>
-          <a:lstStyle/>
-          <a:p>
-            <a:r>
-              <a:rPr lang="fr-FR" dirty="0" smtClean="0"/>
-              <a:t>Etat de l’art - Visualisation</a:t>
-            </a:r>
-            <a:endParaRPr lang="fr-FR" dirty="0"/>
-          </a:p>
-        </p:txBody>
-      </p:sp>
-      <p:sp>
-        <p:nvSpPr>
-          <p:cNvPr id="3" name="Espace réservé du contenu 2"/>
-          <p:cNvSpPr>
-            <a:spLocks noGrp="1"/>
-          </p:cNvSpPr>
-          <p:nvPr>
-            <p:ph idx="1"/>
-          </p:nvPr>
-        </p:nvSpPr>
-        <p:spPr>
-          <a:xfrm>
-            <a:off x="1484310" y="975361"/>
-            <a:ext cx="10018713" cy="4815840"/>
-          </a:xfrm>
-        </p:spPr>
-        <p:txBody>
-          <a:bodyPr/>
-          <a:lstStyle/>
-          <a:p>
-            <a:r>
-              <a:rPr lang="fr-FR" dirty="0" smtClean="0"/>
-              <a:t>Interface graphique Python</a:t>
-            </a:r>
-            <a:endParaRPr lang="fr-FR" dirty="0" smtClean="0"/>
-          </a:p>
-          <a:p>
-            <a:pPr marL="0" indent="0">
-              <a:buNone/>
-            </a:pPr>
-            <a:r>
-              <a:rPr lang="fr-FR" dirty="0" smtClean="0"/>
-              <a:t> </a:t>
-            </a:r>
-          </a:p>
-          <a:p>
-            <a:pPr lvl="1"/>
-            <a:endParaRPr lang="fr-FR" dirty="0"/>
-          </a:p>
-        </p:txBody>
-      </p:sp>
-      <p:sp>
-        <p:nvSpPr>
-          <p:cNvPr id="4" name="Espace réservé du pied de page 3"/>
-          <p:cNvSpPr>
-            <a:spLocks noGrp="1"/>
-          </p:cNvSpPr>
-          <p:nvPr>
-            <p:ph type="ftr" sz="quarter" idx="11"/>
-          </p:nvPr>
-        </p:nvSpPr>
-        <p:spPr/>
-        <p:txBody>
-          <a:bodyPr/>
-          <a:lstStyle/>
-          <a:p>
-            <a:r>
-              <a:rPr lang="en-US" smtClean="0"/>
-              <a:t>Visualisation de capture réseau</a:t>
-            </a:r>
-            <a:endParaRPr lang="en-US" dirty="0"/>
-          </a:p>
-        </p:txBody>
-      </p:sp>
-      <p:sp>
-        <p:nvSpPr>
-          <p:cNvPr id="5" name="Espace réservé du numéro de diapositive 4"/>
-          <p:cNvSpPr>
-            <a:spLocks noGrp="1"/>
-          </p:cNvSpPr>
-          <p:nvPr>
-            <p:ph type="sldNum" sz="quarter" idx="12"/>
-          </p:nvPr>
-        </p:nvSpPr>
-        <p:spPr/>
-        <p:txBody>
-          <a:bodyPr/>
-          <a:lstStyle/>
-          <a:p>
-            <a:fld id="{D57F1E4F-1CFF-5643-939E-217C01CDF565}" type="slidenum">
-              <a:rPr lang="en-US" smtClean="0"/>
-              <a:pPr/>
-              <a:t>11</a:t>
-            </a:fld>
-            <a:endParaRPr lang="en-US" dirty="0"/>
-          </a:p>
-        </p:txBody>
-      </p:sp>
-      <p:graphicFrame>
-        <p:nvGraphicFramePr>
-          <p:cNvPr id="6" name="Tableau 5"/>
-          <p:cNvGraphicFramePr>
-            <a:graphicFrameLocks noGrp="1"/>
-          </p:cNvGraphicFramePr>
-          <p:nvPr>
-            <p:extLst>
-              <p:ext uri="{D42A27DB-BD31-4B8C-83A1-F6EECF244321}">
-                <p14:modId xmlns:p14="http://schemas.microsoft.com/office/powerpoint/2010/main" val="306475626"/>
-              </p:ext>
-            </p:extLst>
-          </p:nvPr>
-        </p:nvGraphicFramePr>
-        <p:xfrm>
-          <a:off x="2050367" y="3249506"/>
-          <a:ext cx="9114939" cy="2123440"/>
-        </p:xfrm>
-        <a:graphic>
-          <a:graphicData uri="http://schemas.openxmlformats.org/drawingml/2006/table">
-            <a:tbl>
-              <a:tblPr firstRow="1" bandRow="1">
-                <a:tableStyleId>{5C22544A-7EE6-4342-B048-85BDC9FD1C3A}</a:tableStyleId>
-              </a:tblPr>
-              <a:tblGrid>
-                <a:gridCol w="1270349"/>
-                <a:gridCol w="4315326"/>
-                <a:gridCol w="3529264"/>
-              </a:tblGrid>
-              <a:tr h="370840">
-                <a:tc>
-                  <a:txBody>
-                    <a:bodyPr/>
-                    <a:lstStyle/>
-                    <a:p>
-                      <a:r>
-                        <a:rPr lang="fr-FR" dirty="0" smtClean="0"/>
-                        <a:t>Titre</a:t>
-                      </a:r>
-                      <a:endParaRPr lang="fr-FR" dirty="0"/>
-                    </a:p>
-                  </a:txBody>
-                  <a:tcPr/>
-                </a:tc>
-                <a:tc>
-                  <a:txBody>
-                    <a:bodyPr/>
-                    <a:lstStyle/>
-                    <a:p>
-                      <a:r>
-                        <a:rPr lang="fr-FR" dirty="0" smtClean="0"/>
-                        <a:t>Avantage</a:t>
-                      </a:r>
-                      <a:endParaRPr lang="fr-FR" dirty="0"/>
-                    </a:p>
-                  </a:txBody>
-                  <a:tcPr/>
-                </a:tc>
-                <a:tc>
-                  <a:txBody>
-                    <a:bodyPr/>
-                    <a:lstStyle/>
-                    <a:p>
-                      <a:r>
-                        <a:rPr lang="fr-FR" dirty="0" err="1" smtClean="0"/>
-                        <a:t>Inconvenient</a:t>
-                      </a:r>
-                      <a:endParaRPr lang="fr-FR" dirty="0"/>
-                    </a:p>
-                  </a:txBody>
-                  <a:tcPr/>
-                </a:tc>
-              </a:tr>
-              <a:tr h="370840">
-                <a:tc>
-                  <a:txBody>
-                    <a:bodyPr/>
-                    <a:lstStyle/>
-                    <a:p>
-                      <a:r>
-                        <a:rPr lang="fr-FR" dirty="0" err="1" smtClean="0"/>
-                        <a:t>PyGTK</a:t>
-                      </a:r>
-                      <a:endParaRPr lang="fr-FR" dirty="0"/>
-                    </a:p>
-                  </a:txBody>
-                  <a:tcPr/>
-                </a:tc>
-                <a:tc>
-                  <a:txBody>
-                    <a:bodyPr/>
-                    <a:lstStyle/>
-                    <a:p>
-                      <a:endParaRPr lang="fr-FR" dirty="0"/>
-                    </a:p>
-                  </a:txBody>
-                  <a:tcPr/>
-                </a:tc>
-                <a:tc>
-                  <a:txBody>
-                    <a:bodyPr/>
-                    <a:lstStyle/>
-                    <a:p>
-                      <a:r>
-                        <a:rPr lang="fr-FR" dirty="0" smtClean="0"/>
-                        <a:t>Pas d’interface Cross-Platform</a:t>
-                      </a:r>
-                      <a:endParaRPr lang="fr-FR" dirty="0"/>
-                    </a:p>
-                  </a:txBody>
-                  <a:tcPr/>
-                </a:tc>
-              </a:tr>
-              <a:tr h="370840">
-                <a:tc>
-                  <a:txBody>
-                    <a:bodyPr/>
-                    <a:lstStyle/>
-                    <a:p>
-                      <a:r>
-                        <a:rPr lang="fr-FR" dirty="0" err="1" smtClean="0"/>
-                        <a:t>PyGUI</a:t>
-                      </a:r>
-                      <a:endParaRPr lang="fr-FR" dirty="0"/>
-                    </a:p>
-                  </a:txBody>
-                  <a:tcPr/>
-                </a:tc>
-                <a:tc>
-                  <a:txBody>
-                    <a:bodyPr/>
-                    <a:lstStyle/>
-                    <a:p>
-                      <a:r>
-                        <a:rPr lang="fr-FR" dirty="0" smtClean="0"/>
-                        <a:t>Simple</a:t>
-                      </a:r>
-                      <a:r>
-                        <a:rPr lang="fr-FR" baseline="0" dirty="0" smtClean="0"/>
-                        <a:t> d’utilisation</a:t>
-                      </a:r>
-                      <a:endParaRPr lang="fr-FR" dirty="0"/>
-                    </a:p>
-                  </a:txBody>
-                  <a:tcPr/>
-                </a:tc>
-                <a:tc>
-                  <a:txBody>
-                    <a:bodyPr/>
-                    <a:lstStyle/>
-                    <a:p>
-                      <a:endParaRPr lang="fr-FR"/>
-                    </a:p>
-                  </a:txBody>
-                  <a:tcPr/>
-                </a:tc>
-              </a:tr>
-              <a:tr h="370840">
-                <a:tc>
-                  <a:txBody>
-                    <a:bodyPr/>
-                    <a:lstStyle/>
-                    <a:p>
-                      <a:r>
-                        <a:rPr lang="fr-FR" dirty="0" err="1" smtClean="0"/>
-                        <a:t>wxPython</a:t>
-                      </a:r>
-                      <a:endParaRPr lang="fr-FR" dirty="0" smtClean="0"/>
-                    </a:p>
-                  </a:txBody>
-                  <a:tcPr/>
-                </a:tc>
-                <a:tc>
-                  <a:txBody>
-                    <a:bodyPr/>
-                    <a:lstStyle/>
-                    <a:p>
-                      <a:r>
-                        <a:rPr lang="fr-FR" dirty="0" smtClean="0"/>
-                        <a:t>Beaucoup de </a:t>
-                      </a:r>
-                      <a:r>
-                        <a:rPr lang="fr-FR" dirty="0" err="1" smtClean="0"/>
-                        <a:t>documentaiton</a:t>
-                      </a:r>
-                      <a:endParaRPr lang="fr-FR" dirty="0"/>
-                    </a:p>
-                  </a:txBody>
-                  <a:tcPr/>
-                </a:tc>
-                <a:tc>
-                  <a:txBody>
-                    <a:bodyPr/>
-                    <a:lstStyle/>
-                    <a:p>
-                      <a:endParaRPr lang="fr-FR"/>
-                    </a:p>
-                  </a:txBody>
-                  <a:tcPr/>
-                </a:tc>
-              </a:tr>
-              <a:tr h="370840">
-                <a:tc>
-                  <a:txBody>
-                    <a:bodyPr/>
-                    <a:lstStyle/>
-                    <a:p>
-                      <a:r>
-                        <a:rPr lang="fr-FR" dirty="0" smtClean="0"/>
-                        <a:t>PyQt4</a:t>
-                      </a:r>
-                      <a:endParaRPr lang="fr-FR" dirty="0" smtClean="0"/>
-                    </a:p>
-                  </a:txBody>
-                  <a:tcPr/>
-                </a:tc>
-                <a:tc>
-                  <a:txBody>
-                    <a:bodyPr/>
-                    <a:lstStyle/>
-                    <a:p>
-                      <a:r>
-                        <a:rPr lang="fr-FR" dirty="0" smtClean="0"/>
-                        <a:t>Bonne Documentation</a:t>
-                      </a:r>
-                    </a:p>
-                    <a:p>
-                      <a:r>
-                        <a:rPr lang="fr-FR" dirty="0" smtClean="0"/>
-                        <a:t>Interface Cross-Platform</a:t>
-                      </a:r>
-                      <a:endParaRPr lang="fr-FR" dirty="0"/>
-                    </a:p>
-                  </a:txBody>
-                  <a:tcPr/>
-                </a:tc>
-                <a:tc>
-                  <a:txBody>
-                    <a:bodyPr/>
-                    <a:lstStyle/>
-                    <a:p>
-                      <a:endParaRPr lang="fr-FR" dirty="0"/>
-                    </a:p>
-                  </a:txBody>
-                  <a:tcPr/>
-                </a:tc>
-              </a:tr>
-            </a:tbl>
-          </a:graphicData>
-        </a:graphic>
-      </p:graphicFrame>
-    </p:spTree>
-    <p:extLst>
-      <p:ext uri="{BB962C8B-B14F-4D97-AF65-F5344CB8AC3E}">
-        <p14:creationId xmlns:p14="http://schemas.microsoft.com/office/powerpoint/2010/main" val="1018623221"/>
-      </p:ext>
-    </p:extLst>
-  </p:cSld>
-  <p:clrMapOvr>
-    <a:masterClrMapping/>
-  </p:clrMapOvr>
-</p:sld>
-</file>
-
-<file path=ppt/slides/slide12.xml><?xml version="1.0" encoding="utf-8"?>
-<p:sld xmlns:a="http://schemas.openxmlformats.org/drawingml/2006/main" xmlns:r="http://schemas.openxmlformats.org/officeDocument/2006/relationships" xmlns:p="http://schemas.openxmlformats.org/presentationml/2006/main">
-  <p:cSld>
-    <p:spTree>
-      <p:nvGrpSpPr>
-        <p:cNvPr id="1" name=""/>
-        <p:cNvGrpSpPr/>
-        <p:nvPr/>
-      </p:nvGrpSpPr>
-      <p:grpSpPr>
-        <a:xfrm>
-          <a:off x="0" y="0"/>
-          <a:ext cx="0" cy="0"/>
-          <a:chOff x="0" y="0"/>
-          <a:chExt cx="0" cy="0"/>
-        </a:xfrm>
-      </p:grpSpPr>
-      <p:sp>
-        <p:nvSpPr>
-          <p:cNvPr id="2" name="Titre 1"/>
-          <p:cNvSpPr>
-            <a:spLocks noGrp="1"/>
-          </p:cNvSpPr>
-          <p:nvPr>
-            <p:ph type="title"/>
-          </p:nvPr>
-        </p:nvSpPr>
-        <p:spPr/>
-        <p:txBody>
-          <a:bodyPr/>
-          <a:lstStyle/>
-          <a:p>
-            <a:r>
-              <a:rPr lang="fr-FR" dirty="0" smtClean="0"/>
-              <a:t>Solutions retenues</a:t>
-            </a:r>
-            <a:endParaRPr lang="fr-FR" dirty="0"/>
-          </a:p>
-        </p:txBody>
-      </p:sp>
-      <p:sp>
-        <p:nvSpPr>
-          <p:cNvPr id="3" name="Espace réservé du contenu 2"/>
-          <p:cNvSpPr>
-            <a:spLocks noGrp="1"/>
-          </p:cNvSpPr>
-          <p:nvPr>
-            <p:ph idx="1"/>
-          </p:nvPr>
-        </p:nvSpPr>
-        <p:spPr/>
-        <p:txBody>
-          <a:bodyPr/>
-          <a:lstStyle/>
-          <a:p>
-            <a:r>
-              <a:rPr lang="fr-FR" dirty="0" smtClean="0"/>
-              <a:t>Fichier de base : </a:t>
-            </a:r>
-            <a:r>
-              <a:rPr lang="fr-FR" dirty="0" err="1" smtClean="0"/>
-              <a:t>pcap</a:t>
-            </a:r>
-            <a:endParaRPr lang="fr-FR" dirty="0" smtClean="0"/>
-          </a:p>
-          <a:p>
-            <a:r>
-              <a:rPr lang="fr-FR" dirty="0" smtClean="0"/>
-              <a:t>Analyse des paquets : </a:t>
-            </a:r>
-            <a:r>
-              <a:rPr lang="fr-FR" dirty="0" err="1" smtClean="0"/>
-              <a:t>Scapy</a:t>
-            </a:r>
-            <a:r>
-              <a:rPr lang="fr-FR" dirty="0" smtClean="0"/>
-              <a:t>, </a:t>
-            </a:r>
-            <a:r>
-              <a:rPr lang="fr-FR" dirty="0" err="1" smtClean="0"/>
-              <a:t>ettercap</a:t>
-            </a:r>
-            <a:r>
-              <a:rPr lang="fr-FR" dirty="0" smtClean="0"/>
-              <a:t>, </a:t>
-            </a:r>
-            <a:r>
-              <a:rPr lang="fr-FR" dirty="0" err="1" smtClean="0"/>
-              <a:t>ChaosReader,dsniff</a:t>
-            </a:r>
-            <a:endParaRPr lang="fr-FR" dirty="0" smtClean="0"/>
-          </a:p>
-          <a:p>
-            <a:r>
-              <a:rPr lang="fr-FR" dirty="0" smtClean="0"/>
-              <a:t>Visualisation : </a:t>
-            </a:r>
-            <a:r>
-              <a:rPr lang="fr-FR" dirty="0" err="1" smtClean="0"/>
-              <a:t>PyQt</a:t>
-            </a:r>
-            <a:endParaRPr lang="fr-FR" dirty="0" smtClean="0"/>
-          </a:p>
-          <a:p>
-            <a:r>
-              <a:rPr lang="fr-FR" dirty="0" smtClean="0"/>
-              <a:t>Génération des paquets : Fichier internet / Génération perso</a:t>
-            </a:r>
-            <a:endParaRPr lang="fr-FR" dirty="0"/>
-          </a:p>
-        </p:txBody>
-      </p:sp>
-      <p:sp>
-        <p:nvSpPr>
-          <p:cNvPr id="4" name="Espace réservé du pied de page 3"/>
-          <p:cNvSpPr>
-            <a:spLocks noGrp="1"/>
-          </p:cNvSpPr>
-          <p:nvPr>
-            <p:ph type="ftr" sz="quarter" idx="11"/>
-          </p:nvPr>
-        </p:nvSpPr>
-        <p:spPr/>
-        <p:txBody>
-          <a:bodyPr/>
-          <a:lstStyle/>
-          <a:p>
-            <a:r>
-              <a:rPr lang="en-US" smtClean="0"/>
-              <a:t>Visualisation de capture réseau</a:t>
-            </a:r>
-            <a:endParaRPr lang="en-US" dirty="0"/>
-          </a:p>
-        </p:txBody>
-      </p:sp>
-      <p:sp>
-        <p:nvSpPr>
-          <p:cNvPr id="5" name="Espace réservé du numéro de diapositive 4"/>
-          <p:cNvSpPr>
-            <a:spLocks noGrp="1"/>
-          </p:cNvSpPr>
-          <p:nvPr>
-            <p:ph type="sldNum" sz="quarter" idx="12"/>
-          </p:nvPr>
-        </p:nvSpPr>
-        <p:spPr/>
-        <p:txBody>
-          <a:bodyPr/>
-          <a:lstStyle/>
-          <a:p>
-            <a:fld id="{D57F1E4F-1CFF-5643-939E-217C01CDF565}" type="slidenum">
-              <a:rPr lang="en-US" smtClean="0"/>
-              <a:pPr/>
-              <a:t>12</a:t>
-            </a:fld>
-            <a:endParaRPr lang="en-US" dirty="0"/>
-          </a:p>
-        </p:txBody>
-      </p:sp>
-    </p:spTree>
-    <p:extLst>
-      <p:ext uri="{BB962C8B-B14F-4D97-AF65-F5344CB8AC3E}">
-        <p14:creationId xmlns:p14="http://schemas.microsoft.com/office/powerpoint/2010/main" val="3954845516"/>
-      </p:ext>
-    </p:extLst>
-  </p:cSld>
-  <p:clrMapOvr>
-    <a:masterClrMapping/>
-  </p:clrMapOvr>
+  <p:timing>
+    <p:tnLst>
+      <p:par>
+        <p:cTn id="1" dur="indefinite" restart="never" nodeType="tmRoot"/>
+      </p:par>
+    </p:tnLst>
+  </p:timing>
 </p:sld>
 </file>
 
@@ -7810,7 +7649,7 @@
           <a:p>
             <a:r>
               <a:rPr lang="fr-FR" dirty="0" smtClean="0"/>
-              <a:t>Design</a:t>
+              <a:t>Travail à venir</a:t>
             </a:r>
             <a:endParaRPr lang="fr-FR" dirty="0"/>
           </a:p>
@@ -7831,7 +7670,60 @@
           <a:bodyPr/>
           <a:lstStyle/>
           <a:p>
-            <a:endParaRPr lang="fr-FR"/>
+            <a:pPr marL="0" indent="0">
+              <a:buNone/>
+            </a:pPr>
+            <a:r>
+              <a:rPr lang="fr-FR" dirty="0" smtClean="0"/>
+              <a:t>Choix d’un ensemble de vues cohérentes entre elles pour la visualisation</a:t>
+            </a:r>
+          </a:p>
+          <a:p>
+            <a:pPr marL="0" indent="0">
+              <a:buNone/>
+            </a:pPr>
+            <a:endParaRPr lang="fr-FR" dirty="0"/>
+          </a:p>
+          <a:p>
+            <a:pPr marL="0" indent="0">
+              <a:buNone/>
+            </a:pPr>
+            <a:r>
+              <a:rPr lang="fr-FR" dirty="0" smtClean="0"/>
+              <a:t>Prise en main des outils comme </a:t>
+            </a:r>
+            <a:r>
+              <a:rPr lang="fr-FR" dirty="0" err="1" smtClean="0"/>
+              <a:t>Ettercap</a:t>
+            </a:r>
+            <a:r>
+              <a:rPr lang="fr-FR" dirty="0" smtClean="0"/>
+              <a:t> ou </a:t>
+            </a:r>
+            <a:r>
+              <a:rPr lang="fr-FR" dirty="0" err="1" smtClean="0"/>
+              <a:t>ChaosReader</a:t>
+            </a:r>
+            <a:r>
+              <a:rPr lang="fr-FR" dirty="0" smtClean="0"/>
+              <a:t> à intégrer au logiciel</a:t>
+            </a:r>
+          </a:p>
+          <a:p>
+            <a:pPr marL="0" indent="0">
+              <a:buNone/>
+            </a:pPr>
+            <a:endParaRPr lang="fr-FR" dirty="0"/>
+          </a:p>
+          <a:p>
+            <a:pPr marL="0" indent="0">
+              <a:buNone/>
+            </a:pPr>
+            <a:r>
+              <a:rPr lang="fr-FR" dirty="0" smtClean="0"/>
+              <a:t>Développement du logiciel</a:t>
+            </a:r>
+            <a:endParaRPr lang="fr-FR" dirty="0" smtClean="0"/>
           </a:p>
         </p:txBody>
       </p:sp>
@@ -7885,13 +7777,20 @@
     </p:spTree>
     <p:extLst>
       <p:ext uri="{BB962C8B-B14F-4D97-AF65-F5344CB8AC3E}">
-        <p14:creationId xmlns:p14="http://schemas.microsoft.com/office/powerpoint/2010/main" val="2436757138"/>
+        <p14:creationId xmlns:p14="http://schemas.microsoft.com/office/powerpoint/2010/main" val="354515756"/>
       </p:ext>
     </p:extLst>
   </p:cSld>
   <p:clrMapOvr>
     <a:masterClrMapping/>
   </p:clrMapOvr>
+  <p:timing>
+    <p:tnLst>
+      <p:par>
+        <p:cTn id="1" dur="indefinite" restart="never" nodeType="tmRoot"/>
+      </p:par>
+    </p:tnLst>
+  </p:timing>
 </p:sld>
 </file>
 
@@ -7919,7 +7818,7 @@
             <a:spLocks noGrp="1"/>
           </p:cNvSpPr>
           <p:nvPr>
-            <p:ph type="ctrTitle"/>
+            <p:ph type="title"/>
           </p:nvPr>
         </p:nvSpPr>
         <p:spPr/>
@@ -7929,7 +7828,7 @@
           <a:p>
             <a:r>
               <a:rPr lang="fr-FR" dirty="0" smtClean="0"/>
-              <a:t>A bientôt !</a:t>
+              <a:t>Spécifications</a:t>
             </a:r>
             <a:endParaRPr lang="fr-FR" dirty="0"/>
           </a:p>
@@ -7937,7 +7836,91 @@
       </p:sp>
       <p:sp>
         <p:nvSpPr>
-          <p:cNvPr id="4" name="Espace réservé du numéro de diapositive 3"/>
+          <p:cNvPr id="3" name="Espace réservé du contenu 2"/>
+          <p:cNvSpPr>
+            <a:spLocks noGrp="1"/>
+          </p:cNvSpPr>
+          <p:nvPr>
+            <p:ph idx="1"/>
+          </p:nvPr>
+        </p:nvSpPr>
+        <p:spPr/>
+        <p:txBody>
+          <a:bodyPr/>
+          <a:lstStyle/>
+          <a:p>
+            <a:r>
+              <a:rPr lang="fr-FR" dirty="0" smtClean="0"/>
+              <a:t>Palier </a:t>
+            </a:r>
+            <a:r>
+              <a:rPr lang="fr-FR" dirty="0"/>
+              <a:t>1 : Développement du </a:t>
+            </a:r>
+            <a:r>
+              <a:rPr lang="fr-FR" dirty="0" smtClean="0"/>
+              <a:t>logiciel avec 2 vues cohérentes et filtres </a:t>
+            </a:r>
+            <a:endParaRPr lang="fr-FR" dirty="0"/>
+          </a:p>
+          <a:p>
+            <a:r>
+              <a:rPr lang="fr-FR" dirty="0"/>
+              <a:t>Palier 2 </a:t>
+            </a:r>
+            <a:r>
+              <a:rPr lang="fr-FR" dirty="0" smtClean="0"/>
+              <a:t>: Intégration des outils de </a:t>
+            </a:r>
+            <a:r>
+              <a:rPr lang="fr-FR" dirty="0" err="1" smtClean="0"/>
+              <a:t>Pentest</a:t>
+            </a:r>
+            <a:r>
+              <a:rPr lang="fr-FR" dirty="0" smtClean="0"/>
+              <a:t> et visualisation des résultats</a:t>
+            </a:r>
+            <a:endParaRPr lang="fr-FR" dirty="0"/>
+          </a:p>
+          <a:p>
+            <a:r>
+              <a:rPr lang="fr-FR" dirty="0"/>
+              <a:t>Palier 3 </a:t>
+            </a:r>
+            <a:r>
+              <a:rPr lang="fr-FR" dirty="0" smtClean="0"/>
+              <a:t>: Ajout de vues supplémentaires</a:t>
+            </a:r>
+            <a:endParaRPr lang="fr-FR" dirty="0"/>
+          </a:p>
+        </p:txBody>
+      </p:sp>
+      <p:sp>
+        <p:nvSpPr>
+          <p:cNvPr id="4" name="Espace réservé du pied de page 3"/>
+          <p:cNvSpPr>
+            <a:spLocks noGrp="1"/>
+          </p:cNvSpPr>
+          <p:nvPr>
+            <p:ph type="ftr" sz="quarter" idx="11"/>
+          </p:nvPr>
+        </p:nvSpPr>
+        <p:spPr/>
+        <p:txBody>
+          <a:bodyPr/>
+          <a:lstStyle/>
+          <a:p>
+            <a:r>
+              <a:rPr lang="en-US" smtClean="0"/>
+              <a:t>Visualisation de capture réseau</a:t>
+            </a:r>
+            <a:endParaRPr lang="en-US" dirty="0"/>
+          </a:p>
+        </p:txBody>
+      </p:sp>
+      <p:sp>
+        <p:nvSpPr>
+          <p:cNvPr id="5" name="Espace réservé du numéro de diapositive 4"/>
           <p:cNvSpPr>
             <a:spLocks noGrp="1"/>
           </p:cNvSpPr>
@@ -7954,6 +7937,407 @@
               <a:rPr lang="en-US" smtClean="0"/>
               <a:pPr/>
               <a:t>14</a:t>
+            </a:fld>
+            <a:endParaRPr lang="en-US" dirty="0"/>
+          </a:p>
+        </p:txBody>
+      </p:sp>
+    </p:spTree>
+    <p:extLst>
+      <p:ext uri="{BB962C8B-B14F-4D97-AF65-F5344CB8AC3E}">
+        <p14:creationId xmlns:p14="http://schemas.microsoft.com/office/powerpoint/2010/main" val="1017012375"/>
+      </p:ext>
+    </p:extLst>
+  </p:cSld>
+  <p:clrMapOvr>
+    <a:masterClrMapping/>
+  </p:clrMapOvr>
+  <p:timing>
+    <p:tnLst>
+      <p:par>
+        <p:cTn id="1" dur="indefinite" restart="never" nodeType="tmRoot"/>
+      </p:par>
+    </p:tnLst>
+  </p:timing>
+</p:sld>
+</file>
+
+<file path=ppt/slides/slide15.xml><?xml version="1.0" encoding="utf-8"?>
+<p:sld xmlns:a="http://schemas.openxmlformats.org/drawingml/2006/main" xmlns:r="http://schemas.openxmlformats.org/officeDocument/2006/relationships" xmlns:p="http://schemas.openxmlformats.org/presentationml/2006/main">
+  <p:cSld>
+    <p:spTree>
+      <p:nvGrpSpPr>
+        <p:cNvPr id="1" name=""/>
+        <p:cNvGrpSpPr/>
+        <p:nvPr/>
+      </p:nvGrpSpPr>
+      <p:grpSpPr>
+        <a:xfrm>
+          <a:off x="0" y="0"/>
+          <a:ext cx="0" cy="0"/>
+          <a:chOff x="0" y="0"/>
+          <a:chExt cx="0" cy="0"/>
+        </a:xfrm>
+      </p:grpSpPr>
+      <p:sp>
+        <p:nvSpPr>
+          <p:cNvPr id="2" name="Titre 1"/>
+          <p:cNvSpPr>
+            <a:spLocks noGrp="1"/>
+          </p:cNvSpPr>
+          <p:nvPr>
+            <p:ph type="title"/>
+          </p:nvPr>
+        </p:nvSpPr>
+        <p:spPr/>
+        <p:txBody>
+          <a:bodyPr/>
+          <a:lstStyle/>
+          <a:p>
+            <a:r>
+              <a:rPr lang="fr-FR" dirty="0" smtClean="0"/>
+              <a:t>Solutions retenues</a:t>
+            </a:r>
+            <a:endParaRPr lang="fr-FR" dirty="0"/>
+          </a:p>
+        </p:txBody>
+      </p:sp>
+      <p:sp>
+        <p:nvSpPr>
+          <p:cNvPr id="3" name="Espace réservé du contenu 2"/>
+          <p:cNvSpPr>
+            <a:spLocks noGrp="1"/>
+          </p:cNvSpPr>
+          <p:nvPr>
+            <p:ph idx="1"/>
+          </p:nvPr>
+        </p:nvSpPr>
+        <p:spPr/>
+        <p:txBody>
+          <a:bodyPr/>
+          <a:lstStyle/>
+          <a:p>
+            <a:r>
+              <a:rPr lang="fr-FR" dirty="0" smtClean="0"/>
+              <a:t>Fichier de base : </a:t>
+            </a:r>
+            <a:r>
+              <a:rPr lang="fr-FR" dirty="0" err="1" smtClean="0"/>
+              <a:t>pcap</a:t>
+            </a:r>
+            <a:endParaRPr lang="fr-FR" dirty="0" smtClean="0"/>
+          </a:p>
+          <a:p>
+            <a:r>
+              <a:rPr lang="fr-FR" dirty="0" smtClean="0"/>
+              <a:t>Analyse des paquets : </a:t>
+            </a:r>
+            <a:r>
+              <a:rPr lang="fr-FR" dirty="0" err="1" smtClean="0"/>
+              <a:t>Scapy</a:t>
+            </a:r>
+            <a:r>
+              <a:rPr lang="fr-FR" dirty="0" smtClean="0"/>
+              <a:t>, </a:t>
+            </a:r>
+            <a:r>
+              <a:rPr lang="fr-FR" dirty="0" err="1" smtClean="0"/>
+              <a:t>ettercap</a:t>
+            </a:r>
+            <a:r>
+              <a:rPr lang="fr-FR" dirty="0" smtClean="0"/>
+              <a:t>, </a:t>
+            </a:r>
+            <a:r>
+              <a:rPr lang="fr-FR" dirty="0" err="1" smtClean="0"/>
+              <a:t>ChaosReader,dsniff</a:t>
+            </a:r>
+            <a:endParaRPr lang="fr-FR" dirty="0" smtClean="0"/>
+          </a:p>
+          <a:p>
+            <a:r>
+              <a:rPr lang="fr-FR" dirty="0" smtClean="0"/>
+              <a:t>Visualisation </a:t>
+            </a:r>
+            <a:r>
+              <a:rPr lang="fr-FR" dirty="0"/>
+              <a:t>: Diagramme parallèle et graphe en réseau de </a:t>
+            </a:r>
+            <a:r>
+              <a:rPr lang="fr-FR" dirty="0" err="1"/>
+              <a:t>noeuds</a:t>
+            </a:r>
+            <a:endParaRPr lang="fr-FR" dirty="0"/>
+          </a:p>
+          <a:p>
+            <a:r>
+              <a:rPr lang="fr-FR" dirty="0" smtClean="0"/>
+              <a:t>IHM </a:t>
+            </a:r>
+            <a:r>
+              <a:rPr lang="fr-FR" dirty="0" smtClean="0"/>
+              <a:t>: </a:t>
+            </a:r>
+            <a:r>
+              <a:rPr lang="fr-FR" dirty="0" err="1" smtClean="0"/>
+              <a:t>PyQt</a:t>
+            </a:r>
+            <a:endParaRPr lang="fr-FR" dirty="0" smtClean="0"/>
+          </a:p>
+        </p:txBody>
+      </p:sp>
+      <p:sp>
+        <p:nvSpPr>
+          <p:cNvPr id="4" name="Espace réservé du pied de page 3"/>
+          <p:cNvSpPr>
+            <a:spLocks noGrp="1"/>
+          </p:cNvSpPr>
+          <p:nvPr>
+            <p:ph type="ftr" sz="quarter" idx="11"/>
+          </p:nvPr>
+        </p:nvSpPr>
+        <p:spPr/>
+        <p:txBody>
+          <a:bodyPr/>
+          <a:lstStyle/>
+          <a:p>
+            <a:r>
+              <a:rPr lang="en-US" smtClean="0"/>
+              <a:t>Visualisation de capture réseau</a:t>
+            </a:r>
+            <a:endParaRPr lang="en-US" dirty="0"/>
+          </a:p>
+        </p:txBody>
+      </p:sp>
+      <p:sp>
+        <p:nvSpPr>
+          <p:cNvPr id="5" name="Espace réservé du numéro de diapositive 4"/>
+          <p:cNvSpPr>
+            <a:spLocks noGrp="1"/>
+          </p:cNvSpPr>
+          <p:nvPr>
+            <p:ph type="sldNum" sz="quarter" idx="12"/>
+          </p:nvPr>
+        </p:nvSpPr>
+        <p:spPr/>
+        <p:txBody>
+          <a:bodyPr/>
+          <a:lstStyle/>
+          <a:p>
+            <a:fld id="{D57F1E4F-1CFF-5643-939E-217C01CDF565}" type="slidenum">
+              <a:rPr lang="en-US" smtClean="0"/>
+              <a:pPr/>
+              <a:t>15</a:t>
+            </a:fld>
+            <a:endParaRPr lang="en-US" dirty="0"/>
+          </a:p>
+        </p:txBody>
+      </p:sp>
+    </p:spTree>
+    <p:extLst>
+      <p:ext uri="{BB962C8B-B14F-4D97-AF65-F5344CB8AC3E}">
+        <p14:creationId xmlns:p14="http://schemas.microsoft.com/office/powerpoint/2010/main" val="3954845516"/>
+      </p:ext>
+    </p:extLst>
+  </p:cSld>
+  <p:clrMapOvr>
+    <a:masterClrMapping/>
+  </p:clrMapOvr>
+  <p:timing>
+    <p:tnLst>
+      <p:par>
+        <p:cTn id="1" dur="indefinite" restart="never" nodeType="tmRoot"/>
+      </p:par>
+    </p:tnLst>
+  </p:timing>
+</p:sld>
+</file>
+
+<file path=ppt/slides/slide16.xml><?xml version="1.0" encoding="utf-8"?>
+<p:sld xmlns:a="http://schemas.openxmlformats.org/drawingml/2006/main" xmlns:r="http://schemas.openxmlformats.org/officeDocument/2006/relationships" xmlns:p="http://schemas.openxmlformats.org/presentationml/2006/main">
+  <p:cSld>
+    <p:spTree>
+      <p:nvGrpSpPr>
+        <p:cNvPr id="1" name=""/>
+        <p:cNvGrpSpPr/>
+        <p:nvPr/>
+      </p:nvGrpSpPr>
+      <p:grpSpPr>
+        <a:xfrm>
+          <a:off x="0" y="0"/>
+          <a:ext cx="0" cy="0"/>
+          <a:chOff x="0" y="0"/>
+          <a:chExt cx="0" cy="0"/>
+        </a:xfrm>
+      </p:grpSpPr>
+      <p:sp>
+        <p:nvSpPr>
+          <p:cNvPr id="2" name="Titre 1"/>
+          <p:cNvSpPr>
+            <a:spLocks noGrp="1"/>
+          </p:cNvSpPr>
+          <p:nvPr>
+            <p:ph type="title"/>
+          </p:nvPr>
+        </p:nvSpPr>
+        <p:spPr/>
+        <p:txBody>
+          <a:bodyPr/>
+          <a:lstStyle/>
+          <a:p>
+            <a:r>
+              <a:rPr lang="fr-FR" dirty="0" smtClean="0"/>
+              <a:t>Design</a:t>
+            </a:r>
+            <a:endParaRPr lang="fr-FR" dirty="0"/>
+          </a:p>
+        </p:txBody>
+      </p:sp>
+      <p:sp>
+        <p:nvSpPr>
+          <p:cNvPr id="3" name="Espace réservé du contenu 2"/>
+          <p:cNvSpPr>
+            <a:spLocks noGrp="1"/>
+          </p:cNvSpPr>
+          <p:nvPr>
+            <p:ph idx="1"/>
+          </p:nvPr>
+        </p:nvSpPr>
+        <p:spPr/>
+        <p:txBody>
+          <a:bodyPr/>
+          <a:lstStyle/>
+          <a:p>
+            <a:endParaRPr lang="fr-FR"/>
+          </a:p>
+        </p:txBody>
+      </p:sp>
+      <p:sp>
+        <p:nvSpPr>
+          <p:cNvPr id="4" name="Espace réservé du pied de page 3"/>
+          <p:cNvSpPr>
+            <a:spLocks noGrp="1"/>
+          </p:cNvSpPr>
+          <p:nvPr>
+            <p:ph type="ftr" sz="quarter" idx="11"/>
+          </p:nvPr>
+        </p:nvSpPr>
+        <p:spPr/>
+        <p:txBody>
+          <a:bodyPr/>
+          <a:lstStyle/>
+          <a:p>
+            <a:r>
+              <a:rPr lang="en-US" smtClean="0"/>
+              <a:t>Visualisation de capture réseau</a:t>
+            </a:r>
+            <a:endParaRPr lang="en-US" dirty="0"/>
+          </a:p>
+        </p:txBody>
+      </p:sp>
+      <p:sp>
+        <p:nvSpPr>
+          <p:cNvPr id="5" name="Espace réservé du numéro de diapositive 4"/>
+          <p:cNvSpPr>
+            <a:spLocks noGrp="1"/>
+          </p:cNvSpPr>
+          <p:nvPr>
+            <p:ph type="sldNum" sz="quarter" idx="12"/>
+          </p:nvPr>
+        </p:nvSpPr>
+        <p:spPr/>
+        <p:txBody>
+          <a:bodyPr/>
+          <a:lstStyle/>
+          <a:p>
+            <a:fld id="{D57F1E4F-1CFF-5643-939E-217C01CDF565}" type="slidenum">
+              <a:rPr lang="en-US" smtClean="0"/>
+              <a:pPr/>
+              <a:t>16</a:t>
+            </a:fld>
+            <a:endParaRPr lang="en-US" dirty="0"/>
+          </a:p>
+        </p:txBody>
+      </p:sp>
+    </p:spTree>
+    <p:extLst>
+      <p:ext uri="{BB962C8B-B14F-4D97-AF65-F5344CB8AC3E}">
+        <p14:creationId xmlns:p14="http://schemas.microsoft.com/office/powerpoint/2010/main" val="2436757138"/>
+      </p:ext>
+    </p:extLst>
+  </p:cSld>
+  <p:clrMapOvr>
+    <a:masterClrMapping/>
+  </p:clrMapOvr>
+  <p:timing>
+    <p:tnLst>
+      <p:par>
+        <p:cTn id="1" dur="indefinite" restart="never" nodeType="tmRoot"/>
+      </p:par>
+    </p:tnLst>
+  </p:timing>
+</p:sld>
+</file>
+
+<file path=ppt/slides/slide17.xml><?xml version="1.0" encoding="utf-8"?>
+<p:sld xmlns:a="http://schemas.openxmlformats.org/drawingml/2006/main" xmlns:r="http://schemas.openxmlformats.org/officeDocument/2006/relationships" xmlns:p="http://schemas.openxmlformats.org/presentationml/2006/main">
+  <p:cSld>
+    <p:spTree>
+      <p:nvGrpSpPr>
+        <p:cNvPr id="1" name=""/>
+        <p:cNvGrpSpPr/>
+        <p:nvPr/>
+      </p:nvGrpSpPr>
+      <p:grpSpPr>
+        <a:xfrm>
+          <a:off x="0" y="0"/>
+          <a:ext cx="0" cy="0"/>
+          <a:chOff x="0" y="0"/>
+          <a:chExt cx="0" cy="0"/>
+        </a:xfrm>
+      </p:grpSpPr>
+      <p:sp>
+        <p:nvSpPr>
+          <p:cNvPr id="2" name="Titre 1"/>
+          <p:cNvSpPr>
+            <a:spLocks noGrp="1"/>
+          </p:cNvSpPr>
+          <p:nvPr>
+            <p:ph type="ctrTitle"/>
+          </p:nvPr>
+        </p:nvSpPr>
+        <p:spPr/>
+        <p:txBody>
+          <a:bodyPr/>
+          <a:lstStyle/>
+          <a:p>
+            <a:r>
+              <a:rPr lang="fr-FR" dirty="0" smtClean="0"/>
+              <a:t>A bientôt !</a:t>
+            </a:r>
+            <a:endParaRPr lang="fr-FR" dirty="0"/>
+          </a:p>
+        </p:txBody>
+      </p:sp>
+      <p:sp>
+        <p:nvSpPr>
+          <p:cNvPr id="4" name="Espace réservé du numéro de diapositive 3"/>
+          <p:cNvSpPr>
+            <a:spLocks noGrp="1"/>
+          </p:cNvSpPr>
+          <p:nvPr>
+            <p:ph type="sldNum" sz="quarter" idx="12"/>
+          </p:nvPr>
+        </p:nvSpPr>
+        <p:spPr/>
+        <p:txBody>
+          <a:bodyPr/>
+          <a:lstStyle/>
+          <a:p>
+            <a:fld id="{D57F1E4F-1CFF-5643-939E-217C01CDF565}" type="slidenum">
+              <a:rPr lang="en-US" smtClean="0"/>
+              <a:pPr/>
+              <a:t>17</a:t>
             </a:fld>
             <a:endParaRPr lang="en-US" dirty="0"/>
           </a:p>
@@ -8371,29 +8755,33 @@
             </a:r>
             <a:r>
               <a:rPr lang="fr-FR" dirty="0" smtClean="0"/>
-              <a:t>:</a:t>
-            </a:r>
+              <a:t>de :</a:t>
+            </a:r>
+            <a:endParaRPr lang="fr-FR" dirty="0" smtClean="0"/>
           </a:p>
           <a:p>
             <a:pPr lvl="1"/>
             <a:r>
+              <a:rPr lang="fr-FR" dirty="0"/>
+              <a:t>Faire un premier tri des données pour faciliter la tâche d’analyse</a:t>
+            </a:r>
+          </a:p>
+          <a:p>
+            <a:pPr lvl="1"/>
+            <a:r>
               <a:rPr lang="fr-FR" dirty="0" smtClean="0"/>
-              <a:t>Présenter les flux de manière lisible et graphiquement organisée</a:t>
-            </a:r>
-            <a:endParaRPr lang="fr-FR" dirty="0" smtClean="0"/>
+              <a:t>Présenter </a:t>
+            </a:r>
+            <a:r>
+              <a:rPr lang="fr-FR" dirty="0" smtClean="0"/>
+              <a:t>les flux de manière lisible et graphiquement organisée</a:t>
+            </a:r>
           </a:p>
           <a:p>
             <a:pPr lvl="1"/>
             <a:r>
               <a:rPr lang="fr-FR" dirty="0" smtClean="0"/>
-              <a:t>Mettre en évidence des sessions et des informations sensibles</a:t>
-            </a:r>
-          </a:p>
-          <a:p>
-            <a:pPr lvl="1"/>
-            <a:r>
-              <a:rPr lang="fr-FR" dirty="0" smtClean="0"/>
-              <a:t>De détecter des vulnérabilités connues</a:t>
+              <a:t>Intégrer des outils d’analyse de trace au logiciel</a:t>
             </a:r>
             <a:endParaRPr lang="fr-FR" dirty="0" smtClean="0"/>
           </a:p>
@@ -8532,15 +8920,7 @@
             <a:pPr lvl="1"/>
             <a:r>
               <a:rPr lang="fr-FR" dirty="0" smtClean="0"/>
-              <a:t>Extraire Données </a:t>
-            </a:r>
-            <a:r>
-              <a:rPr lang="fr-FR" dirty="0" smtClean="0"/>
-              <a:t>sensibles : mot de </a:t>
-            </a:r>
-            <a:r>
-              <a:rPr lang="fr-FR" dirty="0" smtClean="0"/>
-              <a:t>passe, pièce jointe…</a:t>
+              <a:t>Extraire Données sensibles : mot de passe, pièce jointe…</a:t>
             </a:r>
           </a:p>
           <a:p>
@@ -8554,13 +8934,8 @@
             <a:pPr lvl="1"/>
             <a:r>
               <a:rPr lang="fr-FR" dirty="0" smtClean="0"/>
-              <a:t>Obtenir des informations sur les systèmes </a:t>
-            </a:r>
-            <a:r>
-              <a:rPr lang="fr-FR" dirty="0" smtClean="0"/>
-              <a:t>du réseau</a:t>
-            </a:r>
-            <a:endParaRPr lang="fr-FR" dirty="0" smtClean="0"/>
+              <a:t>Obtenir des informations sur les systèmes du réseau</a:t>
+            </a:r>
           </a:p>
           <a:p>
             <a:pPr lvl="1"/>
@@ -8568,7 +8943,6 @@
               <a:rPr lang="fr-FR" dirty="0" smtClean="0"/>
               <a:t>Cartographier le réseau</a:t>
             </a:r>
-            <a:endParaRPr lang="fr-FR" dirty="0" smtClean="0"/>
           </a:p>
           <a:p>
             <a:pPr lvl="1"/>
@@ -8642,6 +9016,13 @@
   <p:clrMapOvr>
     <a:masterClrMapping/>
   </p:clrMapOvr>
+  <p:timing>
+    <p:tnLst>
+      <p:par>
+        <p:cTn id="1" dur="indefinite" restart="never" nodeType="tmRoot"/>
+      </p:par>
+    </p:tnLst>
+  </p:timing>
 </p:sld>
 </file>
 
@@ -8679,116 +9060,41 @@
           <a:p>
             <a:r>
               <a:rPr lang="fr-FR" dirty="0" smtClean="0"/>
-              <a:t>Présentation Générale</a:t>
+              <a:t>Etat de l’art - Visualisation</a:t>
             </a:r>
             <a:endParaRPr lang="fr-FR" dirty="0"/>
           </a:p>
         </p:txBody>
       </p:sp>
-      <p:sp>
-        <p:nvSpPr>
-          <p:cNvPr id="3" name="Espace réservé du contenu 2"/>
-          <p:cNvSpPr>
-            <a:spLocks noGrp="1"/>
-          </p:cNvSpPr>
+      <p:pic>
+        <p:nvPicPr>
+          <p:cNvPr id="6" name="Espace réservé du contenu 5"/>
+          <p:cNvPicPr>
+            <a:picLocks noGrp="1" noChangeAspect="1"/>
+          </p:cNvPicPr>
           <p:nvPr>
             <p:ph idx="1"/>
           </p:nvPr>
-        </p:nvSpPr>
-        <p:spPr/>
-        <p:txBody>
-          <a:bodyPr>
-            <a:normAutofit/>
-          </a:bodyPr>
-          <a:lstStyle/>
-          <a:p>
-            <a:r>
-              <a:rPr lang="fr-FR" dirty="0">
-                <a:solidFill>
-                  <a:srgbClr val="FF0000"/>
-                </a:solidFill>
-              </a:rPr>
-              <a:t>Comment visualiser les résultats </a:t>
-            </a:r>
-            <a:r>
-              <a:rPr lang="fr-FR" dirty="0" smtClean="0">
-                <a:solidFill>
-                  <a:srgbClr val="FF0000"/>
-                </a:solidFill>
-              </a:rPr>
-              <a:t>?</a:t>
-            </a:r>
-          </a:p>
-          <a:p>
-            <a:pPr lvl="1"/>
-            <a:r>
-              <a:rPr lang="fr-FR" dirty="0" smtClean="0">
-                <a:solidFill>
-                  <a:srgbClr val="FF0000"/>
-                </a:solidFill>
-              </a:rPr>
-              <a:t>Visualisation cartographiée du réseau sniffé</a:t>
-            </a:r>
-          </a:p>
-          <a:p>
-            <a:pPr lvl="1"/>
-            <a:r>
-              <a:rPr lang="fr-FR" dirty="0">
-                <a:solidFill>
-                  <a:srgbClr val="FF0000"/>
-                </a:solidFill>
-              </a:rPr>
-              <a:t>Visualisation des sessions </a:t>
-            </a:r>
-            <a:r>
-              <a:rPr lang="fr-FR" dirty="0" smtClean="0">
-                <a:solidFill>
-                  <a:srgbClr val="FF0000"/>
-                </a:solidFill>
-              </a:rPr>
-              <a:t>reconstruites</a:t>
-            </a:r>
-          </a:p>
-          <a:p>
-            <a:pPr lvl="1"/>
-            <a:r>
-              <a:rPr lang="fr-FR" dirty="0" smtClean="0">
-                <a:solidFill>
-                  <a:srgbClr val="FF0000"/>
-                </a:solidFill>
-              </a:rPr>
-              <a:t>Visualisation des trames par filtrage (comme sur </a:t>
-            </a:r>
-            <a:r>
-              <a:rPr lang="fr-FR" dirty="0" err="1" smtClean="0">
-                <a:solidFill>
-                  <a:srgbClr val="FF0000"/>
-                </a:solidFill>
-              </a:rPr>
-              <a:t>wireshark</a:t>
-            </a:r>
-            <a:r>
-              <a:rPr lang="fr-FR" dirty="0" smtClean="0">
-                <a:solidFill>
-                  <a:srgbClr val="FF0000"/>
-                </a:solidFill>
-              </a:rPr>
-              <a:t>)</a:t>
-            </a:r>
-            <a:endParaRPr lang="fr-FR" dirty="0">
-              <a:solidFill>
-                <a:srgbClr val="FF0000"/>
-              </a:solidFill>
-            </a:endParaRPr>
-          </a:p>
-          <a:p>
-            <a:pPr marL="457200" lvl="1" indent="0">
-              <a:buNone/>
-            </a:pPr>
-            <a:endParaRPr lang="fr-FR" dirty="0" smtClean="0"/>
-          </a:p>
-        </p:txBody>
-      </p:sp>
+        </p:nvPicPr>
+        <p:blipFill>
+          <a:blip r:embed="rId2">
+            <a:extLst>
+              <a:ext uri="{28A0092B-C50C-407E-A947-70E740481C1C}">
+                <a14:useLocalDpi xmlns:a14="http://schemas.microsoft.com/office/drawing/2010/main" val="0"/>
+              </a:ext>
+            </a:extLst>
+          </a:blip>
+          <a:stretch>
+            <a:fillRect/>
+          </a:stretch>
+        </p:blipFill>
+        <p:spPr>
+          <a:xfrm>
+            <a:off x="3038631" y="2362200"/>
+            <a:ext cx="6910075" cy="3124200"/>
+          </a:xfrm>
+        </p:spPr>
+      </p:pic>
       <p:sp>
         <p:nvSpPr>
           <p:cNvPr id="4" name="Espace réservé du numéro de diapositive 3"/>
@@ -8829,8 +9135,16 @@
           <a:lstStyle/>
           <a:p>
             <a:r>
-              <a:rPr lang="en-US" smtClean="0"/>
-              <a:t>Visualisation de capture réseau</a:t>
+              <a:rPr lang="en-US" dirty="0" err="1" smtClean="0"/>
+              <a:t>Visualisation</a:t>
+            </a:r>
+            <a:r>
+              <a:rPr lang="en-US" dirty="0" smtClean="0"/>
+              <a:t> de capture </a:t>
+            </a:r>
+            <a:r>
+              <a:rPr lang="en-US" dirty="0" err="1" smtClean="0"/>
+              <a:t>réseau</a:t>
             </a:r>
             <a:endParaRPr lang="en-US" dirty="0"/>
           </a:p>
@@ -8846,6 +9160,13 @@
   <p:clrMapOvr>
     <a:masterClrMapping/>
   </p:clrMapOvr>
+  <p:timing>
+    <p:tnLst>
+      <p:par>
+        <p:cTn id="1" dur="indefinite" restart="never" nodeType="tmRoot"/>
+      </p:par>
+    </p:tnLst>
+  </p:timing>
 </p:sld>
 </file>
 
@@ -8882,91 +9203,14 @@
           <a:lstStyle/>
           <a:p>
             <a:r>
+              <a:rPr lang="fr-FR" dirty="0"/>
+              <a:t>Etat de l’art -</a:t>
+            </a:r>
+            <a:r>
               <a:rPr lang="fr-FR" dirty="0" smtClean="0"/>
-              <a:t>Spécifications</a:t>
+              <a:t> Visualisation</a:t>
             </a:r>
             <a:endParaRPr lang="fr-FR" dirty="0"/>
-          </a:p>
-        </p:txBody>
-      </p:sp>
-      <p:sp>
-        <p:nvSpPr>
-          <p:cNvPr id="3" name="Espace réservé du contenu 2"/>
-          <p:cNvSpPr>
-            <a:spLocks noGrp="1"/>
-          </p:cNvSpPr>
-          <p:nvPr>
-            <p:ph idx="1"/>
-          </p:nvPr>
-        </p:nvSpPr>
-        <p:spPr/>
-        <p:txBody>
-          <a:bodyPr/>
-          <a:lstStyle/>
-          <a:p>
-            <a:r>
-              <a:rPr lang="fr-FR" dirty="0" smtClean="0"/>
-              <a:t>Palier </a:t>
-            </a:r>
-            <a:r>
-              <a:rPr lang="fr-FR" dirty="0" smtClean="0"/>
-              <a:t>1 </a:t>
-            </a:r>
-            <a:r>
-              <a:rPr lang="fr-FR" dirty="0"/>
-              <a:t>: Développement du logiciel </a:t>
-            </a:r>
-            <a:endParaRPr lang="fr-FR" dirty="0" smtClean="0"/>
-          </a:p>
-          <a:p>
-            <a:pPr lvl="1"/>
-            <a:r>
-              <a:rPr lang="fr-FR" dirty="0"/>
-              <a:t>I</a:t>
-            </a:r>
-            <a:r>
-              <a:rPr lang="fr-FR" dirty="0" smtClean="0"/>
-              <a:t>nterfacé </a:t>
-            </a:r>
-            <a:r>
-              <a:rPr lang="fr-FR" dirty="0"/>
-              <a:t>avec les logiciels </a:t>
-            </a:r>
-            <a:r>
-              <a:rPr lang="fr-FR" dirty="0" err="1"/>
-              <a:t>Ettercap</a:t>
-            </a:r>
-            <a:r>
-              <a:rPr lang="fr-FR" dirty="0"/>
-              <a:t> et </a:t>
-            </a:r>
-            <a:r>
-              <a:rPr lang="fr-FR" dirty="0" err="1" smtClean="0"/>
-              <a:t>ChaosReader</a:t>
-            </a:r>
-            <a:endParaRPr lang="fr-FR" dirty="0" smtClean="0"/>
-          </a:p>
-          <a:p>
-            <a:pPr lvl="1"/>
-            <a:r>
-              <a:rPr lang="fr-FR" dirty="0" smtClean="0"/>
-              <a:t>Permet l’extraction de données sensibles non chiffrée (mot de passe, fichier)</a:t>
-            </a:r>
-          </a:p>
-          <a:p>
-            <a:pPr lvl="1"/>
-            <a:r>
-              <a:rPr lang="fr-FR" dirty="0" smtClean="0"/>
-              <a:t>Reconstruction des flux TCP, email, session HTTP</a:t>
-            </a:r>
-          </a:p>
-          <a:p>
-            <a:pPr lvl="1"/>
-            <a:endParaRPr lang="fr-FR" dirty="0" smtClean="0"/>
-          </a:p>
-          <a:p>
-            <a:pPr lvl="1"/>
-            <a:endParaRPr lang="fr-FR" dirty="0" smtClean="0"/>
           </a:p>
         </p:txBody>
       </p:sp>
@@ -9017,16 +9261,114 @@
           </a:p>
         </p:txBody>
       </p:sp>
+      <p:pic>
+        <p:nvPicPr>
+          <p:cNvPr id="8" name="Espace réservé du contenu 7"/>
+          <p:cNvPicPr>
+            <a:picLocks noGrp="1" noChangeAspect="1"/>
+          </p:cNvPicPr>
+          <p:nvPr>
+            <p:ph idx="1"/>
+          </p:nvPr>
+        </p:nvPicPr>
+        <p:blipFill rotWithShape="1">
+          <a:blip r:embed="rId2">
+            <a:extLst>
+              <a:ext uri="{28A0092B-C50C-407E-A947-70E740481C1C}">
+                <a14:useLocalDpi xmlns:a14="http://schemas.microsoft.com/office/drawing/2010/main" val="0"/>
+              </a:ext>
+            </a:extLst>
+          </a:blip>
+          <a:srcRect r="432" b="800"/>
+          <a:stretch/>
+        </p:blipFill>
+        <p:spPr>
+          <a:xfrm>
+            <a:off x="6777264" y="2611241"/>
+            <a:ext cx="4174592" cy="3099192"/>
+          </a:xfrm>
+        </p:spPr>
+      </p:pic>
+      <p:sp>
+        <p:nvSpPr>
+          <p:cNvPr id="10" name="ZoneTexte 9"/>
+          <p:cNvSpPr txBox="1"/>
+          <p:nvPr/>
+        </p:nvSpPr>
+        <p:spPr>
+          <a:xfrm>
+            <a:off x="2641600" y="2973236"/>
+            <a:ext cx="4117531" cy="2031325"/>
+          </a:xfrm>
+          <a:prstGeom prst="rect">
+            <a:avLst/>
+          </a:prstGeom>
+          <a:noFill/>
+        </p:spPr>
+        <p:txBody>
+          <a:bodyPr wrap="square" rtlCol="0">
+            <a:spAutoFit/>
+          </a:bodyPr>
+          <a:lstStyle/>
+          <a:p>
+            <a:r>
+              <a:rPr lang="fr-FR" dirty="0" smtClean="0"/>
+              <a:t>Graphe de réseau</a:t>
+            </a:r>
+          </a:p>
+          <a:p>
+            <a:pPr marL="285750" indent="-285750">
+              <a:buFontTx/>
+              <a:buChar char="-"/>
+            </a:pPr>
+            <a:endParaRPr lang="fr-FR" dirty="0"/>
+          </a:p>
+          <a:p>
+            <a:pPr marL="285750" indent="-285750">
+              <a:buFontTx/>
+              <a:buChar char="-"/>
+            </a:pPr>
+            <a:r>
+              <a:rPr lang="fr-FR" dirty="0" smtClean="0"/>
+              <a:t>Représentation des nœuds et des communications échangées</a:t>
+            </a:r>
+          </a:p>
+          <a:p>
+            <a:pPr marL="285750" indent="-285750">
+              <a:buFontTx/>
+              <a:buChar char="-"/>
+            </a:pPr>
+            <a:endParaRPr lang="fr-FR" dirty="0"/>
+          </a:p>
+          <a:p>
+            <a:pPr marL="285750" indent="-285750">
+              <a:buFontTx/>
+              <a:buChar char="-"/>
+            </a:pPr>
+            <a:r>
+              <a:rPr lang="fr-FR" dirty="0" smtClean="0"/>
+              <a:t>Semble particulièrement approprié dans le cas d’analyse de trafic</a:t>
+            </a:r>
+          </a:p>
+        </p:txBody>
+      </p:sp>
     </p:spTree>
     <p:extLst>
       <p:ext uri="{BB962C8B-B14F-4D97-AF65-F5344CB8AC3E}">
-        <p14:creationId xmlns:p14="http://schemas.microsoft.com/office/powerpoint/2010/main" val="354515756"/>
+        <p14:creationId xmlns:p14="http://schemas.microsoft.com/office/powerpoint/2010/main" val="1151814533"/>
       </p:ext>
     </p:extLst>
   </p:cSld>
   <p:clrMapOvr>
     <a:masterClrMapping/>
   </p:clrMapOvr>
+  <p:timing>
+    <p:tnLst>
+      <p:par>
+        <p:cTn id="1" dur="indefinite" restart="never" nodeType="tmRoot"/>
+      </p:par>
+    </p:tnLst>
+  </p:timing>
 </p:sld>
 </file>
 
@@ -9063,74 +9405,46 @@
           <a:lstStyle/>
           <a:p>
             <a:r>
+              <a:rPr lang="fr-FR" dirty="0"/>
+              <a:t>Etat de l’art -</a:t>
+            </a:r>
+            <a:r>
               <a:rPr lang="fr-FR" dirty="0" smtClean="0"/>
-              <a:t>Spécifications</a:t>
+              <a:t> Visualisation</a:t>
             </a:r>
             <a:endParaRPr lang="fr-FR" dirty="0"/>
           </a:p>
         </p:txBody>
       </p:sp>
-      <p:sp>
-        <p:nvSpPr>
-          <p:cNvPr id="3" name="Espace réservé du contenu 2"/>
-          <p:cNvSpPr>
-            <a:spLocks noGrp="1"/>
-          </p:cNvSpPr>
+      <p:pic>
+        <p:nvPicPr>
+          <p:cNvPr id="6" name="Espace réservé du contenu 5"/>
+          <p:cNvPicPr>
+            <a:picLocks noGrp="1" noChangeAspect="1"/>
+          </p:cNvPicPr>
           <p:nvPr>
             <p:ph idx="1"/>
           </p:nvPr>
-        </p:nvSpPr>
-        <p:spPr/>
-        <p:txBody>
-          <a:bodyPr/>
-          <a:lstStyle/>
-          <a:p>
-            <a:r>
-              <a:rPr lang="fr-FR" dirty="0" smtClean="0"/>
-              <a:t>Palier </a:t>
-            </a:r>
-            <a:r>
-              <a:rPr lang="fr-FR" dirty="0" smtClean="0"/>
-              <a:t>2 : Ajouts des fonctionnalités</a:t>
-            </a:r>
-          </a:p>
-          <a:p>
-            <a:pPr lvl="1"/>
-            <a:r>
-              <a:rPr lang="fr-FR" dirty="0"/>
-              <a:t>Attaque des protocoles de chiffrements faibles </a:t>
-            </a:r>
-            <a:endParaRPr lang="fr-FR" dirty="0" smtClean="0"/>
-          </a:p>
-          <a:p>
-            <a:pPr lvl="1"/>
-            <a:r>
-              <a:rPr lang="fr-FR" dirty="0" smtClean="0"/>
-              <a:t>Cartographie du réseau</a:t>
-            </a:r>
-            <a:endParaRPr lang="fr-FR" dirty="0" smtClean="0"/>
-          </a:p>
-          <a:p>
-            <a:pPr lvl="1"/>
-            <a:r>
-              <a:rPr lang="fr-FR" dirty="0" smtClean="0"/>
-              <a:t>Extraction </a:t>
-            </a:r>
-            <a:r>
-              <a:rPr lang="fr-FR" dirty="0" smtClean="0"/>
-              <a:t>d’information pour des attaques de type MITM</a:t>
-            </a:r>
-          </a:p>
-          <a:p>
-            <a:pPr lvl="1"/>
-            <a:endParaRPr lang="fr-FR" dirty="0" smtClean="0"/>
-          </a:p>
-          <a:p>
-            <a:pPr lvl="1"/>
-            <a:endParaRPr lang="fr-FR" dirty="0" smtClean="0"/>
-          </a:p>
-        </p:txBody>
-      </p:sp>
+        </p:nvPicPr>
+        <p:blipFill>
+          <a:blip r:embed="rId2">
+            <a:extLst>
+              <a:ext uri="{28A0092B-C50C-407E-A947-70E740481C1C}">
+                <a14:useLocalDpi xmlns:a14="http://schemas.microsoft.com/office/drawing/2010/main" val="0"/>
+              </a:ext>
+            </a:extLst>
+          </a:blip>
+          <a:stretch>
+            <a:fillRect/>
+          </a:stretch>
+        </p:blipFill>
+        <p:spPr>
+          <a:xfrm>
+            <a:off x="7573439" y="2438399"/>
+            <a:ext cx="3378417" cy="3124200"/>
+          </a:xfrm>
+        </p:spPr>
+      </p:pic>
       <p:sp>
         <p:nvSpPr>
           <p:cNvPr id="4" name="Espace réservé du pied de page 3"/>
@@ -9178,16 +9492,83 @@
           </a:p>
         </p:txBody>
       </p:sp>
+      <p:sp>
+        <p:nvSpPr>
+          <p:cNvPr id="7" name="ZoneTexte 6"/>
+          <p:cNvSpPr txBox="1"/>
+          <p:nvPr/>
+        </p:nvSpPr>
+        <p:spPr>
+          <a:xfrm>
+            <a:off x="2572279" y="2798396"/>
+            <a:ext cx="5001160" cy="1754326"/>
+          </a:xfrm>
+          <a:prstGeom prst="rect">
+            <a:avLst/>
+          </a:prstGeom>
+          <a:noFill/>
+        </p:spPr>
+        <p:txBody>
+          <a:bodyPr wrap="square" rtlCol="0">
+            <a:spAutoFit/>
+          </a:bodyPr>
+          <a:lstStyle/>
+          <a:p>
+            <a:r>
+              <a:rPr lang="fr-FR" dirty="0" smtClean="0"/>
+              <a:t>Vue circulaire</a:t>
+            </a:r>
+          </a:p>
+          <a:p>
+            <a:endParaRPr lang="fr-FR" dirty="0"/>
+          </a:p>
+          <a:p>
+            <a:pPr marL="285750" indent="-285750">
+              <a:buFontTx/>
+              <a:buChar char="-"/>
+            </a:pPr>
+            <a:r>
+              <a:rPr lang="fr-FR" dirty="0" smtClean="0"/>
+              <a:t>Délimite une zone interne et une zone externe</a:t>
+            </a:r>
+          </a:p>
+          <a:p>
+            <a:pPr marL="285750" indent="-285750">
+              <a:buFontTx/>
+              <a:buChar char="-"/>
+            </a:pPr>
+            <a:endParaRPr lang="fr-FR" dirty="0"/>
+          </a:p>
+          <a:p>
+            <a:pPr marL="285750" indent="-285750">
+              <a:buFontTx/>
+              <a:buChar char="-"/>
+            </a:pPr>
+            <a:r>
+              <a:rPr lang="fr-FR" dirty="0" smtClean="0"/>
+              <a:t>Pourrait être intéressant pour délimiter réseau local et zone extérieure</a:t>
+            </a:r>
+            <a:endParaRPr lang="fr-FR" dirty="0"/>
+          </a:p>
+        </p:txBody>
+      </p:sp>
     </p:spTree>
     <p:extLst>
       <p:ext uri="{BB962C8B-B14F-4D97-AF65-F5344CB8AC3E}">
-        <p14:creationId xmlns:p14="http://schemas.microsoft.com/office/powerpoint/2010/main" val="1017012375"/>
+        <p14:creationId xmlns:p14="http://schemas.microsoft.com/office/powerpoint/2010/main" val="1863967510"/>
       </p:ext>
     </p:extLst>
   </p:cSld>
   <p:clrMapOvr>
     <a:masterClrMapping/>
   </p:clrMapOvr>
+  <p:timing>
+    <p:tnLst>
+      <p:par>
+        <p:cTn id="1" dur="indefinite" restart="never" nodeType="tmRoot"/>
+      </p:par>
+    </p:tnLst>
+  </p:timing>
 </p:sld>
 </file>
 
@@ -9224,54 +9605,14 @@
           <a:lstStyle/>
           <a:p>
             <a:r>
+              <a:rPr lang="fr-FR" dirty="0"/>
+              <a:t>Etat de l’art -</a:t>
+            </a:r>
+            <a:r>
               <a:rPr lang="fr-FR" dirty="0" smtClean="0"/>
-              <a:t>Spécifications</a:t>
+              <a:t> Visualisation</a:t>
             </a:r>
             <a:endParaRPr lang="fr-FR" dirty="0"/>
-          </a:p>
-        </p:txBody>
-      </p:sp>
-      <p:sp>
-        <p:nvSpPr>
-          <p:cNvPr id="3" name="Espace réservé du contenu 2"/>
-          <p:cNvSpPr>
-            <a:spLocks noGrp="1"/>
-          </p:cNvSpPr>
-          <p:nvPr>
-            <p:ph idx="1"/>
-          </p:nvPr>
-        </p:nvSpPr>
-        <p:spPr/>
-        <p:txBody>
-          <a:bodyPr/>
-          <a:lstStyle/>
-          <a:p>
-            <a:r>
-              <a:rPr lang="fr-FR" dirty="0" smtClean="0"/>
-              <a:t>Palier </a:t>
-            </a:r>
-            <a:r>
-              <a:rPr lang="fr-FR" dirty="0" smtClean="0"/>
-              <a:t>3 : Ajout de fonctionnalités inédites</a:t>
-            </a:r>
-            <a:endParaRPr lang="fr-FR" dirty="0" smtClean="0"/>
-          </a:p>
-          <a:p>
-            <a:pPr lvl="1"/>
-            <a:r>
-              <a:rPr lang="fr-FR" dirty="0" smtClean="0"/>
-              <a:t>Identification automatique de vulnérabilités connues</a:t>
-            </a:r>
-          </a:p>
-          <a:p>
-            <a:pPr marL="457200" lvl="1" indent="0">
-              <a:buNone/>
-            </a:pPr>
-            <a:endParaRPr lang="fr-FR" dirty="0" smtClean="0"/>
-          </a:p>
-          <a:p>
-            <a:pPr lvl="1"/>
-            <a:endParaRPr lang="fr-FR" dirty="0" smtClean="0"/>
           </a:p>
         </p:txBody>
       </p:sp>
@@ -9322,16 +9663,144 @@
           </a:p>
         </p:txBody>
       </p:sp>
+      <p:pic>
+        <p:nvPicPr>
+          <p:cNvPr id="8" name="Espace réservé du contenu 7"/>
+          <p:cNvPicPr>
+            <a:picLocks noGrp="1" noChangeAspect="1"/>
+          </p:cNvPicPr>
+          <p:nvPr>
+            <p:ph idx="1"/>
+          </p:nvPr>
+        </p:nvPicPr>
+        <p:blipFill>
+          <a:blip r:embed="rId2">
+            <a:extLst>
+              <a:ext uri="{28A0092B-C50C-407E-A947-70E740481C1C}">
+                <a14:useLocalDpi xmlns:a14="http://schemas.microsoft.com/office/drawing/2010/main" val="0"/>
+              </a:ext>
+            </a:extLst>
+          </a:blip>
+          <a:stretch>
+            <a:fillRect/>
+          </a:stretch>
+        </p:blipFill>
+        <p:spPr>
+          <a:xfrm>
+            <a:off x="5555972" y="2438399"/>
+            <a:ext cx="5670549" cy="3124200"/>
+          </a:xfrm>
+        </p:spPr>
+      </p:pic>
+      <p:sp>
+        <p:nvSpPr>
+          <p:cNvPr id="9" name="ZoneTexte 8"/>
+          <p:cNvSpPr txBox="1"/>
+          <p:nvPr/>
+        </p:nvSpPr>
+        <p:spPr>
+          <a:xfrm>
+            <a:off x="2336034" y="3538834"/>
+            <a:ext cx="3219938" cy="1477328"/>
+          </a:xfrm>
+          <a:prstGeom prst="rect">
+            <a:avLst/>
+          </a:prstGeom>
+          <a:noFill/>
+        </p:spPr>
+        <p:txBody>
+          <a:bodyPr wrap="square" rtlCol="0">
+            <a:spAutoFit/>
+          </a:bodyPr>
+          <a:lstStyle/>
+          <a:p>
+            <a:r>
+              <a:rPr lang="fr-FR" dirty="0" smtClean="0"/>
+              <a:t>Vue parallèle</a:t>
+            </a:r>
+          </a:p>
+          <a:p>
+            <a:pPr marL="285750" indent="-285750">
+              <a:buFontTx/>
+              <a:buChar char="-"/>
+            </a:pPr>
+            <a:endParaRPr lang="fr-FR" dirty="0"/>
+          </a:p>
+          <a:p>
+            <a:pPr marL="285750" indent="-285750">
+              <a:buFontTx/>
+              <a:buChar char="-"/>
+            </a:pPr>
+            <a:r>
+              <a:rPr lang="fr-FR" dirty="0" smtClean="0"/>
+              <a:t>Particulièrement intéressant</a:t>
+            </a:r>
+          </a:p>
+          <a:p>
+            <a:pPr marL="285750" indent="-285750">
+              <a:buFontTx/>
+              <a:buChar char="-"/>
+            </a:pPr>
+            <a:endParaRPr lang="fr-FR" dirty="0"/>
+          </a:p>
+          <a:p>
+            <a:pPr marL="285750" indent="-285750">
+              <a:buFontTx/>
+              <a:buChar char="-"/>
+            </a:pPr>
+            <a:r>
+              <a:rPr lang="fr-FR" dirty="0" err="1"/>
+              <a:t>s</a:t>
+            </a:r>
+            <a:r>
+              <a:rPr lang="fr-FR" dirty="0" err="1" smtClean="0"/>
+              <a:t>rc</a:t>
+            </a:r>
+            <a:r>
+              <a:rPr lang="fr-FR" dirty="0" smtClean="0"/>
+              <a:t> | port </a:t>
+            </a:r>
+            <a:r>
+              <a:rPr lang="fr-FR" dirty="0" err="1" smtClean="0"/>
+              <a:t>src</a:t>
+            </a:r>
+            <a:r>
+              <a:rPr lang="fr-FR" dirty="0" smtClean="0"/>
+              <a:t> | port </a:t>
+            </a:r>
+            <a:r>
+              <a:rPr lang="fr-FR" dirty="0" err="1" smtClean="0"/>
+              <a:t>dest</a:t>
+            </a:r>
+            <a:r>
+              <a:rPr lang="fr-FR" dirty="0" smtClean="0"/>
+              <a:t> | </a:t>
+            </a:r>
+            <a:r>
+              <a:rPr lang="fr-FR" dirty="0" err="1" smtClean="0"/>
+              <a:t>dest</a:t>
+            </a:r>
+            <a:endParaRPr lang="fr-FR" dirty="0" smtClean="0"/>
+          </a:p>
+        </p:txBody>
+      </p:sp>
     </p:spTree>
     <p:extLst>
       <p:ext uri="{BB962C8B-B14F-4D97-AF65-F5344CB8AC3E}">
-        <p14:creationId xmlns:p14="http://schemas.microsoft.com/office/powerpoint/2010/main" val="2840076335"/>
+        <p14:creationId xmlns:p14="http://schemas.microsoft.com/office/powerpoint/2010/main" val="1476332504"/>
       </p:ext>
     </p:extLst>
   </p:cSld>
   <p:clrMapOvr>
     <a:masterClrMapping/>
   </p:clrMapOvr>
+  <p:timing>
+    <p:tnLst>
+      <p:par>
+        <p:cTn id="1" dur="indefinite" restart="never" nodeType="tmRoot"/>
+      </p:par>
+    </p:tnLst>
+  </p:timing>
 </p:sld>
 </file>
 

</xml_diff>

<commit_message>
Presentation mise à jour
</commit_message>
<xml_diff>
--- a/Présentation de mi-projet/Outils de visualisation de capture réseau.pptx
+++ b/Présentation de mi-projet/Outils de visualisation de capture réseau.pptx
@@ -5,7 +5,7 @@
     <p:sldMasterId id="2147483648" r:id="rId1"/>
   </p:sldMasterIdLst>
   <p:notesMasterIdLst>
-    <p:notesMasterId r:id="rId19"/>
+    <p:notesMasterId r:id="rId20"/>
   </p:notesMasterIdLst>
   <p:sldIdLst>
     <p:sldId id="256" r:id="rId2"/>
@@ -24,7 +24,8 @@
     <p:sldId id="267" r:id="rId15"/>
     <p:sldId id="263" r:id="rId16"/>
     <p:sldId id="272" r:id="rId17"/>
-    <p:sldId id="273" r:id="rId18"/>
+    <p:sldId id="279" r:id="rId18"/>
+    <p:sldId id="273" r:id="rId19"/>
   </p:sldIdLst>
   <p:sldSz cx="12192000" cy="6858000"/>
   <p:notesSz cx="6858000" cy="9144000"/>
@@ -213,7 +214,7 @@
           <a:p>
             <a:fld id="{29C83E6C-40B6-4DF7-B2E2-F703E66700A2}" type="datetimeFigureOut">
               <a:rPr lang="fr-FR" smtClean="0"/>
-              <a:t>16/12/2015</a:t>
+              <a:t>18/12/2015</a:t>
             </a:fld>
             <a:endParaRPr lang="fr-FR"/>
           </a:p>
@@ -630,7 +631,91 @@
           <a:p>
             <a:fld id="{6D9ED5D0-C663-444C-AB50-D90E1FD41D05}" type="slidenum">
               <a:rPr lang="fr-FR" smtClean="0"/>
-              <a:t>17</a:t>
+              <a:t>3</a:t>
+            </a:fld>
+            <a:endParaRPr lang="fr-FR"/>
+          </a:p>
+        </p:txBody>
+      </p:sp>
+    </p:spTree>
+    <p:extLst>
+      <p:ext uri="{BB962C8B-B14F-4D97-AF65-F5344CB8AC3E}">
+        <p14:creationId xmlns:p14="http://schemas.microsoft.com/office/powerpoint/2010/main" val="3594969785"/>
+      </p:ext>
+    </p:extLst>
+  </p:cSld>
+  <p:clrMapOvr>
+    <a:masterClrMapping/>
+  </p:clrMapOvr>
+</p:notes>
+</file>
+
+<file path=ppt/notesSlides/notesSlide3.xml><?xml version="1.0" encoding="utf-8"?>
+<p:notes xmlns:a="http://schemas.openxmlformats.org/drawingml/2006/main" xmlns:r="http://schemas.openxmlformats.org/officeDocument/2006/relationships" xmlns:p="http://schemas.openxmlformats.org/presentationml/2006/main">
+  <p:cSld>
+    <p:spTree>
+      <p:nvGrpSpPr>
+        <p:cNvPr id="1" name=""/>
+        <p:cNvGrpSpPr/>
+        <p:nvPr/>
+      </p:nvGrpSpPr>
+      <p:grpSpPr>
+        <a:xfrm>
+          <a:off x="0" y="0"/>
+          <a:ext cx="0" cy="0"/>
+          <a:chOff x="0" y="0"/>
+          <a:chExt cx="0" cy="0"/>
+        </a:xfrm>
+      </p:grpSpPr>
+      <p:sp>
+        <p:nvSpPr>
+          <p:cNvPr id="2" name="Espace réservé de l'image des diapositives 1"/>
+          <p:cNvSpPr>
+            <a:spLocks noGrp="1" noRot="1" noChangeAspect="1"/>
+          </p:cNvSpPr>
+          <p:nvPr>
+            <p:ph type="sldImg"/>
+          </p:nvPr>
+        </p:nvSpPr>
+        <p:spPr/>
+      </p:sp>
+      <p:sp>
+        <p:nvSpPr>
+          <p:cNvPr id="3" name="Espace réservé des commentaires 2"/>
+          <p:cNvSpPr>
+            <a:spLocks noGrp="1"/>
+          </p:cNvSpPr>
+          <p:nvPr>
+            <p:ph type="body" idx="1"/>
+          </p:nvPr>
+        </p:nvSpPr>
+        <p:spPr/>
+        <p:txBody>
+          <a:bodyPr/>
+          <a:lstStyle/>
+          <a:p>
+            <a:endParaRPr lang="fr-FR"/>
+          </a:p>
+        </p:txBody>
+      </p:sp>
+      <p:sp>
+        <p:nvSpPr>
+          <p:cNvPr id="4" name="Espace réservé du numéro de diapositive 3"/>
+          <p:cNvSpPr>
+            <a:spLocks noGrp="1"/>
+          </p:cNvSpPr>
+          <p:nvPr>
+            <p:ph type="sldNum" sz="quarter" idx="10"/>
+          </p:nvPr>
+        </p:nvSpPr>
+        <p:spPr/>
+        <p:txBody>
+          <a:bodyPr/>
+          <a:lstStyle/>
+          <a:p>
+            <a:fld id="{6D9ED5D0-C663-444C-AB50-D90E1FD41D05}" type="slidenum">
+              <a:rPr lang="fr-FR" smtClean="0"/>
+              <a:t>18</a:t>
             </a:fld>
             <a:endParaRPr lang="fr-FR"/>
           </a:p>
@@ -1149,9 +1234,9 @@
           <a:bodyPr/>
           <a:lstStyle/>
           <a:p>
-            <a:fld id="{00E9EAD4-C926-4B8B-A4F7-4BE6E421E4C2}" type="datetime1">
+            <a:fld id="{427174C2-E043-4047-83C8-93B575BB0569}" type="datetime1">
               <a:rPr lang="en-US" smtClean="0"/>
-              <a:t>12/16/2015</a:t>
+              <a:t>12/18/2015</a:t>
             </a:fld>
             <a:endParaRPr lang="en-US" dirty="0"/>
           </a:p>
@@ -1177,10 +1262,6 @@
           <a:bodyPr/>
           <a:lstStyle/>
           <a:p>
-            <a:r>
-              <a:rPr lang="en-US" smtClean="0"/>
-              <a:t>Visualisation de capture réseau</a:t>
-            </a:r>
             <a:endParaRPr lang="en-US" dirty="0"/>
           </a:p>
         </p:txBody>
@@ -1445,9 +1526,9 @@
           <a:bodyPr/>
           <a:lstStyle/>
           <a:p>
-            <a:fld id="{581B4B38-A6C9-45D6-8314-6945096249FD}" type="datetime1">
+            <a:fld id="{65409856-FC92-4130-BD3D-33DFF2B9C7BE}" type="datetime1">
               <a:rPr lang="en-US" smtClean="0"/>
-              <a:t>12/16/2015</a:t>
+              <a:t>12/18/2015</a:t>
             </a:fld>
             <a:endParaRPr lang="en-US" dirty="0"/>
           </a:p>
@@ -1468,10 +1549,6 @@
           <a:bodyPr/>
           <a:lstStyle/>
           <a:p>
-            <a:r>
-              <a:rPr lang="en-US" smtClean="0"/>
-              <a:t>Visualisation de capture réseau</a:t>
-            </a:r>
             <a:endParaRPr lang="en-US" dirty="0"/>
           </a:p>
         </p:txBody>
@@ -1693,9 +1770,9 @@
           <a:bodyPr/>
           <a:lstStyle/>
           <a:p>
-            <a:fld id="{5BABE05B-B8E7-4D72-BABE-A32F6DA188AB}" type="datetime1">
+            <a:fld id="{AC175D40-1F61-41C5-89FE-3212C3B36A4C}" type="datetime1">
               <a:rPr lang="en-US" smtClean="0"/>
-              <a:t>12/16/2015</a:t>
+              <a:t>12/18/2015</a:t>
             </a:fld>
             <a:endParaRPr lang="en-US" dirty="0"/>
           </a:p>
@@ -1716,10 +1793,6 @@
           <a:bodyPr/>
           <a:lstStyle/>
           <a:p>
-            <a:r>
-              <a:rPr lang="en-US" smtClean="0"/>
-              <a:t>Visualisation de capture réseau</a:t>
-            </a:r>
             <a:endParaRPr lang="en-US" dirty="0"/>
           </a:p>
         </p:txBody>
@@ -2233,9 +2306,9 @@
           <a:bodyPr/>
           <a:lstStyle/>
           <a:p>
-            <a:fld id="{F7B97766-5341-4C95-85B2-713CBFF7EAF3}" type="datetime1">
+            <a:fld id="{3BD64DF3-00FF-4F39-A1A1-B32D070273FA}" type="datetime1">
               <a:rPr lang="en-US" smtClean="0"/>
-              <a:t>12/16/2015</a:t>
+              <a:t>12/18/2015</a:t>
             </a:fld>
             <a:endParaRPr lang="en-US" dirty="0"/>
           </a:p>
@@ -2256,10 +2329,6 @@
           <a:bodyPr/>
           <a:lstStyle/>
           <a:p>
-            <a:r>
-              <a:rPr lang="en-US" smtClean="0"/>
-              <a:t>Visualisation de capture réseau</a:t>
-            </a:r>
             <a:endParaRPr lang="en-US" dirty="0"/>
           </a:p>
         </p:txBody>
@@ -2481,9 +2550,9 @@
           <a:bodyPr/>
           <a:lstStyle/>
           <a:p>
-            <a:fld id="{39528A74-A6C0-4C95-8A92-C7FF16AF47CF}" type="datetime1">
+            <a:fld id="{CB35671B-CF6B-4637-8A42-DC8BC6C37F8D}" type="datetime1">
               <a:rPr lang="en-US" smtClean="0"/>
-              <a:t>12/16/2015</a:t>
+              <a:t>12/18/2015</a:t>
             </a:fld>
             <a:endParaRPr lang="en-US" dirty="0"/>
           </a:p>
@@ -2504,10 +2573,6 @@
           <a:bodyPr/>
           <a:lstStyle/>
           <a:p>
-            <a:r>
-              <a:rPr lang="en-US" smtClean="0"/>
-              <a:t>Visualisation de capture réseau</a:t>
-            </a:r>
             <a:endParaRPr lang="en-US" dirty="0"/>
           </a:p>
         </p:txBody>
@@ -3013,9 +3078,9 @@
           <a:bodyPr/>
           <a:lstStyle/>
           <a:p>
-            <a:fld id="{EDF64AB2-57DD-4E25-9E1B-38B44ACB1436}" type="datetime1">
+            <a:fld id="{BCC717D2-2C81-47BF-BE47-4C8A753C577B}" type="datetime1">
               <a:rPr lang="en-US" smtClean="0"/>
-              <a:t>12/16/2015</a:t>
+              <a:t>12/18/2015</a:t>
             </a:fld>
             <a:endParaRPr lang="en-US" dirty="0"/>
           </a:p>
@@ -3036,10 +3101,6 @@
           <a:bodyPr/>
           <a:lstStyle/>
           <a:p>
-            <a:r>
-              <a:rPr lang="en-US" smtClean="0"/>
-              <a:t>Visualisation de capture réseau</a:t>
-            </a:r>
             <a:endParaRPr lang="en-US" dirty="0"/>
           </a:p>
         </p:txBody>
@@ -3310,9 +3371,9 @@
           <a:bodyPr/>
           <a:lstStyle/>
           <a:p>
-            <a:fld id="{C901E06B-4A2E-47C3-B359-8555ED12CE45}" type="datetime1">
+            <a:fld id="{EE8C62F0-D687-4B60-950E-FB10655D2F5D}" type="datetime1">
               <a:rPr lang="en-US" smtClean="0"/>
-              <a:t>12/16/2015</a:t>
+              <a:t>12/18/2015</a:t>
             </a:fld>
             <a:endParaRPr lang="en-US" dirty="0"/>
           </a:p>
@@ -3333,10 +3394,6 @@
           <a:bodyPr/>
           <a:lstStyle/>
           <a:p>
-            <a:r>
-              <a:rPr lang="en-US" smtClean="0"/>
-              <a:t>Visualisation de capture réseau</a:t>
-            </a:r>
             <a:endParaRPr lang="en-US" dirty="0"/>
           </a:p>
         </p:txBody>
@@ -3484,9 +3541,9 @@
           <a:bodyPr/>
           <a:lstStyle/>
           <a:p>
-            <a:fld id="{07D15D2D-74CE-4639-96E1-F567065FF664}" type="datetime1">
+            <a:fld id="{BDD4FF59-DCCA-4BE8-BAC9-D1BDEE5B7044}" type="datetime1">
               <a:rPr lang="en-US" smtClean="0"/>
-              <a:t>12/16/2015</a:t>
+              <a:t>12/18/2015</a:t>
             </a:fld>
             <a:endParaRPr lang="en-US" dirty="0"/>
           </a:p>
@@ -3507,10 +3564,6 @@
           <a:bodyPr/>
           <a:lstStyle/>
           <a:p>
-            <a:r>
-              <a:rPr lang="en-US" smtClean="0"/>
-              <a:t>Visualisation de capture réseau</a:t>
-            </a:r>
             <a:endParaRPr lang="en-US" dirty="0"/>
           </a:p>
         </p:txBody>
@@ -3664,9 +3717,9 @@
           <a:bodyPr/>
           <a:lstStyle/>
           <a:p>
-            <a:fld id="{2939545B-2DE5-475A-8506-74CA7DE21467}" type="datetime1">
+            <a:fld id="{0EA06C07-2567-46AE-9A1E-A9BA616FD782}" type="datetime1">
               <a:rPr lang="en-US" smtClean="0"/>
-              <a:t>12/16/2015</a:t>
+              <a:t>12/18/2015</a:t>
             </a:fld>
             <a:endParaRPr lang="en-US" dirty="0"/>
           </a:p>
@@ -3687,10 +3740,6 @@
           <a:bodyPr/>
           <a:lstStyle/>
           <a:p>
-            <a:r>
-              <a:rPr lang="en-US" smtClean="0"/>
-              <a:t>Visualisation de capture réseau</a:t>
-            </a:r>
             <a:endParaRPr lang="en-US" dirty="0"/>
           </a:p>
         </p:txBody>
@@ -3834,9 +3883,9 @@
           <a:bodyPr/>
           <a:lstStyle/>
           <a:p>
-            <a:fld id="{1E9F4905-8AEE-49DF-9472-70497A0E91B4}" type="datetime1">
+            <a:fld id="{EFDF63F9-5FB8-46E8-A4E7-C8DB02CE27F0}" type="datetime1">
               <a:rPr lang="en-US" smtClean="0"/>
-              <a:t>12/16/2015</a:t>
+              <a:t>12/18/2015</a:t>
             </a:fld>
             <a:endParaRPr lang="en-US" dirty="0"/>
           </a:p>
@@ -3857,10 +3906,6 @@
           <a:bodyPr/>
           <a:lstStyle/>
           <a:p>
-            <a:r>
-              <a:rPr lang="en-US" smtClean="0"/>
-              <a:t>Visualisation de capture réseau</a:t>
-            </a:r>
             <a:endParaRPr lang="en-US" dirty="0"/>
           </a:p>
         </p:txBody>
@@ -4085,9 +4130,9 @@
           <a:bodyPr/>
           <a:lstStyle/>
           <a:p>
-            <a:fld id="{19B510B9-D177-4200-8179-CA39B6DC0518}" type="datetime1">
+            <a:fld id="{1423040E-FAED-438D-9802-5E836B575149}" type="datetime1">
               <a:rPr lang="en-US" smtClean="0"/>
-              <a:t>12/16/2015</a:t>
+              <a:t>12/18/2015</a:t>
             </a:fld>
             <a:endParaRPr lang="en-US" dirty="0"/>
           </a:p>
@@ -4108,10 +4153,6 @@
           <a:bodyPr/>
           <a:lstStyle/>
           <a:p>
-            <a:r>
-              <a:rPr lang="en-US" smtClean="0"/>
-              <a:t>Visualisation de capture réseau</a:t>
-            </a:r>
             <a:endParaRPr lang="en-US" dirty="0"/>
           </a:p>
         </p:txBody>
@@ -4382,9 +4423,9 @@
           <a:bodyPr/>
           <a:lstStyle/>
           <a:p>
-            <a:fld id="{AB1F93A1-0D33-4A63-91AD-1E92492AD5CC}" type="datetime1">
+            <a:fld id="{62FA9761-7A62-4A71-9401-FD0C5E640B7B}" type="datetime1">
               <a:rPr lang="en-US" smtClean="0"/>
-              <a:t>12/16/2015</a:t>
+              <a:t>12/18/2015</a:t>
             </a:fld>
             <a:endParaRPr lang="en-US" dirty="0"/>
           </a:p>
@@ -4405,10 +4446,6 @@
           <a:bodyPr/>
           <a:lstStyle/>
           <a:p>
-            <a:r>
-              <a:rPr lang="en-US" smtClean="0"/>
-              <a:t>Visualisation de capture réseau</a:t>
-            </a:r>
             <a:endParaRPr lang="en-US" dirty="0"/>
           </a:p>
         </p:txBody>
@@ -4824,9 +4861,9 @@
           <a:bodyPr/>
           <a:lstStyle/>
           <a:p>
-            <a:fld id="{ABBCD0D1-17A5-4ADF-AA9E-3FCA4AE0C985}" type="datetime1">
+            <a:fld id="{5648B999-86BB-48D9-8A70-DAA47F322DA4}" type="datetime1">
               <a:rPr lang="en-US" smtClean="0"/>
-              <a:t>12/16/2015</a:t>
+              <a:t>12/18/2015</a:t>
             </a:fld>
             <a:endParaRPr lang="en-US" dirty="0"/>
           </a:p>
@@ -4847,10 +4884,6 @@
           <a:bodyPr/>
           <a:lstStyle/>
           <a:p>
-            <a:r>
-              <a:rPr lang="en-US" smtClean="0"/>
-              <a:t>Visualisation de capture réseau</a:t>
-            </a:r>
             <a:endParaRPr lang="en-US" dirty="0"/>
           </a:p>
         </p:txBody>
@@ -4942,9 +4975,9 @@
           <a:bodyPr/>
           <a:lstStyle/>
           <a:p>
-            <a:fld id="{FB107B98-6743-446F-8AEA-6064604AFE0E}" type="datetime1">
+            <a:fld id="{D06D7BAB-4E8C-4BFE-A9D0-0B7167CD8CAC}" type="datetime1">
               <a:rPr lang="en-US" smtClean="0"/>
-              <a:t>12/16/2015</a:t>
+              <a:t>12/18/2015</a:t>
             </a:fld>
             <a:endParaRPr lang="en-US" dirty="0"/>
           </a:p>
@@ -4965,10 +4998,6 @@
           <a:bodyPr/>
           <a:lstStyle/>
           <a:p>
-            <a:r>
-              <a:rPr lang="en-US" smtClean="0"/>
-              <a:t>Visualisation de capture réseau</a:t>
-            </a:r>
             <a:endParaRPr lang="en-US" dirty="0"/>
           </a:p>
         </p:txBody>
@@ -5037,9 +5066,9 @@
           <a:bodyPr/>
           <a:lstStyle/>
           <a:p>
-            <a:fld id="{191E4130-0D16-4618-B141-0C7AE836E344}" type="datetime1">
+            <a:fld id="{36FF0F6C-F4C9-4A86-A96E-412B30148120}" type="datetime1">
               <a:rPr lang="en-US" smtClean="0"/>
-              <a:t>12/16/2015</a:t>
+              <a:t>12/18/2015</a:t>
             </a:fld>
             <a:endParaRPr lang="en-US" dirty="0"/>
           </a:p>
@@ -5060,10 +5089,6 @@
           <a:bodyPr/>
           <a:lstStyle/>
           <a:p>
-            <a:r>
-              <a:rPr lang="en-US" smtClean="0"/>
-              <a:t>Visualisation de capture réseau</a:t>
-            </a:r>
             <a:endParaRPr lang="en-US" dirty="0"/>
           </a:p>
         </p:txBody>
@@ -5320,9 +5345,9 @@
           <a:bodyPr/>
           <a:lstStyle/>
           <a:p>
-            <a:fld id="{CC5F74CF-0229-417B-9F56-ED832D6E9968}" type="datetime1">
+            <a:fld id="{72F3CFE2-A04C-449E-BF51-F31152ED7E50}" type="datetime1">
               <a:rPr lang="en-US" smtClean="0"/>
-              <a:t>12/16/2015</a:t>
+              <a:t>12/18/2015</a:t>
             </a:fld>
             <a:endParaRPr lang="en-US" dirty="0"/>
           </a:p>
@@ -5343,10 +5368,6 @@
           <a:bodyPr/>
           <a:lstStyle/>
           <a:p>
-            <a:r>
-              <a:rPr lang="en-US" smtClean="0"/>
-              <a:t>Visualisation de capture réseau</a:t>
-            </a:r>
             <a:endParaRPr lang="en-US" dirty="0"/>
           </a:p>
         </p:txBody>
@@ -5611,9 +5632,9 @@
           <a:bodyPr/>
           <a:lstStyle/>
           <a:p>
-            <a:fld id="{CE5D3A7C-2C1D-438F-8A5C-BE43AA35AFA1}" type="datetime1">
+            <a:fld id="{7D881E42-397A-4ADA-A5AB-CB69A185695A}" type="datetime1">
               <a:rPr lang="en-US" smtClean="0"/>
-              <a:t>12/16/2015</a:t>
+              <a:t>12/18/2015</a:t>
             </a:fld>
             <a:endParaRPr lang="en-US" dirty="0"/>
           </a:p>
@@ -5634,10 +5655,6 @@
           <a:bodyPr/>
           <a:lstStyle/>
           <a:p>
-            <a:r>
-              <a:rPr lang="en-US" smtClean="0"/>
-              <a:t>Visualisation de capture réseau</a:t>
-            </a:r>
             <a:endParaRPr lang="en-US" dirty="0"/>
           </a:p>
         </p:txBody>
@@ -6141,9 +6158,9 @@
             </a:lvl1pPr>
           </a:lstStyle>
           <a:p>
-            <a:fld id="{7E2C03DA-6DD8-4EE6-98D5-5AEE914510C6}" type="datetime1">
+            <a:fld id="{55891851-214B-445E-8EA1-7EA833EE578D}" type="datetime1">
               <a:rPr lang="en-US" smtClean="0"/>
-              <a:t>12/16/2015</a:t>
+              <a:t>12/18/2015</a:t>
             </a:fld>
             <a:endParaRPr lang="en-US" dirty="0"/>
           </a:p>
@@ -6182,10 +6199,6 @@
             </a:lvl1pPr>
           </a:lstStyle>
           <a:p>
-            <a:r>
-              <a:rPr lang="en-US" smtClean="0"/>
-              <a:t>Visualisation de capture réseau</a:t>
-            </a:r>
             <a:endParaRPr lang="en-US" dirty="0"/>
           </a:p>
         </p:txBody>
@@ -6254,7 +6267,7 @@
     <p:sldLayoutId id="2147483658" r:id="rId16"/>
     <p:sldLayoutId id="2147483659" r:id="rId17"/>
   </p:sldLayoutIdLst>
-  <p:hf hdr="0" dt="0"/>
+  <p:hf hdr="0" ftr="0" dt="0"/>
   <p:txStyles>
     <p:titleStyle>
       <a:lvl1pPr algn="ctr" defTabSz="457200" rtl="0" eaLnBrk="1" latinLnBrk="0" hangingPunct="1">
@@ -6741,36 +6754,21 @@
             <p:ph type="sldNum" sz="quarter" idx="12"/>
           </p:nvPr>
         </p:nvSpPr>
-        <p:spPr/>
-        <p:txBody>
-          <a:bodyPr/>
-          <a:lstStyle/>
-          <a:p>
-            <a:fld id="{D57F1E4F-1CFF-5643-939E-217C01CDF565}" type="slidenum">
-              <a:rPr lang="en-US" smtClean="0"/>
-              <a:pPr/>
-              <a:t>1</a:t>
-            </a:fld>
-            <a:endParaRPr lang="en-US" dirty="0"/>
-          </a:p>
-        </p:txBody>
-      </p:sp>
-      <p:sp>
-        <p:nvSpPr>
-          <p:cNvPr id="5" name="Espace réservé du pied de page 4"/>
-          <p:cNvSpPr>
-            <a:spLocks noGrp="1"/>
-          </p:cNvSpPr>
-          <p:nvPr>
-            <p:ph type="ftr" sz="quarter" idx="11"/>
-          </p:nvPr>
-        </p:nvSpPr>
-        <p:spPr/>
-        <p:txBody>
-          <a:bodyPr/>
-          <a:lstStyle/>
-          <a:p>
-            <a:endParaRPr lang="en-US" dirty="0"/>
+        <p:spPr>
+          <a:xfrm>
+            <a:off x="10783330" y="5883275"/>
+            <a:ext cx="719693" cy="550476"/>
+          </a:xfrm>
+        </p:spPr>
+        <p:txBody>
+          <a:bodyPr/>
+          <a:lstStyle/>
+          <a:p>
+            <a:r>
+              <a:rPr lang="en-US" sz="1800" dirty="0" smtClean="0"/>
+              <a:t>1 / 18</a:t>
+            </a:r>
+            <a:endParaRPr lang="en-US" sz="1800" dirty="0"/>
           </a:p>
         </p:txBody>
       </p:sp>
@@ -6868,29 +6866,6 @@
       </p:pic>
       <p:sp>
         <p:nvSpPr>
-          <p:cNvPr id="4" name="Espace réservé du pied de page 3"/>
-          <p:cNvSpPr>
-            <a:spLocks noGrp="1"/>
-          </p:cNvSpPr>
-          <p:nvPr>
-            <p:ph type="ftr" sz="quarter" idx="11"/>
-          </p:nvPr>
-        </p:nvSpPr>
-        <p:spPr/>
-        <p:txBody>
-          <a:bodyPr/>
-          <a:lstStyle/>
-          <a:p>
-            <a:r>
-              <a:rPr lang="en-US" smtClean="0"/>
-              <a:t>Visualisation de capture réseau</a:t>
-            </a:r>
-            <a:endParaRPr lang="en-US" dirty="0"/>
-          </a:p>
-        </p:txBody>
-      </p:sp>
-      <p:sp>
-        <p:nvSpPr>
           <p:cNvPr id="5" name="Espace réservé du numéro de diapositive 4"/>
           <p:cNvSpPr>
             <a:spLocks noGrp="1"/>
@@ -6899,17 +6874,26 @@
             <p:ph type="sldNum" sz="quarter" idx="12"/>
           </p:nvPr>
         </p:nvSpPr>
-        <p:spPr/>
+        <p:spPr>
+          <a:xfrm>
+            <a:off x="10626811" y="5875369"/>
+            <a:ext cx="876213" cy="344199"/>
+          </a:xfrm>
+        </p:spPr>
         <p:txBody>
           <a:bodyPr/>
           <a:lstStyle/>
           <a:p>
             <a:fld id="{D57F1E4F-1CFF-5643-939E-217C01CDF565}" type="slidenum">
-              <a:rPr lang="en-US" smtClean="0"/>
+              <a:rPr lang="en-US" sz="1800" smtClean="0"/>
               <a:pPr/>
               <a:t>10</a:t>
             </a:fld>
-            <a:endParaRPr lang="en-US" dirty="0"/>
+            <a:r>
+              <a:rPr lang="en-US" sz="1800" dirty="0" smtClean="0"/>
+              <a:t> / 18</a:t>
+            </a:r>
+            <a:endParaRPr lang="en-US" sz="1800" dirty="0"/>
           </a:p>
         </p:txBody>
       </p:sp>
@@ -7076,29 +7060,6 @@
       </p:pic>
       <p:sp>
         <p:nvSpPr>
-          <p:cNvPr id="4" name="Espace réservé du pied de page 3"/>
-          <p:cNvSpPr>
-            <a:spLocks noGrp="1"/>
-          </p:cNvSpPr>
-          <p:nvPr>
-            <p:ph type="ftr" sz="quarter" idx="11"/>
-          </p:nvPr>
-        </p:nvSpPr>
-        <p:spPr/>
-        <p:txBody>
-          <a:bodyPr/>
-          <a:lstStyle/>
-          <a:p>
-            <a:r>
-              <a:rPr lang="en-US" smtClean="0"/>
-              <a:t>Visualisation de capture réseau</a:t>
-            </a:r>
-            <a:endParaRPr lang="en-US" dirty="0"/>
-          </a:p>
-        </p:txBody>
-      </p:sp>
-      <p:sp>
-        <p:nvSpPr>
           <p:cNvPr id="5" name="Espace réservé du numéro de diapositive 4"/>
           <p:cNvSpPr>
             <a:spLocks noGrp="1"/>
@@ -7107,17 +7068,29 @@
             <p:ph type="sldNum" sz="quarter" idx="12"/>
           </p:nvPr>
         </p:nvSpPr>
-        <p:spPr/>
-        <p:txBody>
-          <a:bodyPr/>
-          <a:lstStyle/>
-          <a:p>
-            <a:fld id="{D57F1E4F-1CFF-5643-939E-217C01CDF565}" type="slidenum">
-              <a:rPr lang="en-US" smtClean="0"/>
-              <a:pPr/>
-              <a:t>11</a:t>
-            </a:fld>
-            <a:endParaRPr lang="en-US" dirty="0"/>
+        <p:spPr>
+          <a:xfrm>
+            <a:off x="10717427" y="5867131"/>
+            <a:ext cx="785597" cy="365125"/>
+          </a:xfrm>
+        </p:spPr>
+        <p:txBody>
+          <a:bodyPr/>
+          <a:lstStyle/>
+          <a:p>
+            <a:r>
+              <a:rPr lang="en-US" sz="1800" dirty="0" smtClean="0"/>
+              <a:t>11 </a:t>
+            </a:r>
+            <a:r>
+              <a:rPr lang="en-US" sz="1800" dirty="0"/>
+              <a:t>/ </a:t>
+            </a:r>
+            <a:r>
+              <a:rPr lang="en-US" sz="1800" dirty="0" smtClean="0"/>
+              <a:t>18</a:t>
+            </a:r>
+            <a:endParaRPr lang="en-US" sz="1800" dirty="0"/>
           </a:p>
         </p:txBody>
       </p:sp>
@@ -7269,29 +7242,6 @@
       </p:sp>
       <p:sp>
         <p:nvSpPr>
-          <p:cNvPr id="4" name="Espace réservé du pied de page 3"/>
-          <p:cNvSpPr>
-            <a:spLocks noGrp="1"/>
-          </p:cNvSpPr>
-          <p:nvPr>
-            <p:ph type="ftr" sz="quarter" idx="11"/>
-          </p:nvPr>
-        </p:nvSpPr>
-        <p:spPr/>
-        <p:txBody>
-          <a:bodyPr/>
-          <a:lstStyle/>
-          <a:p>
-            <a:r>
-              <a:rPr lang="en-US" smtClean="0"/>
-              <a:t>Visualisation de capture réseau</a:t>
-            </a:r>
-            <a:endParaRPr lang="en-US" dirty="0"/>
-          </a:p>
-        </p:txBody>
-      </p:sp>
-      <p:sp>
-        <p:nvSpPr>
           <p:cNvPr id="5" name="Espace réservé du numéro de diapositive 4"/>
           <p:cNvSpPr>
             <a:spLocks noGrp="1"/>
@@ -7300,17 +7250,29 @@
             <p:ph type="sldNum" sz="quarter" idx="12"/>
           </p:nvPr>
         </p:nvSpPr>
-        <p:spPr/>
-        <p:txBody>
-          <a:bodyPr/>
-          <a:lstStyle/>
-          <a:p>
-            <a:fld id="{D57F1E4F-1CFF-5643-939E-217C01CDF565}" type="slidenum">
-              <a:rPr lang="en-US" smtClean="0"/>
-              <a:pPr/>
-              <a:t>12</a:t>
-            </a:fld>
-            <a:endParaRPr lang="en-US" dirty="0"/>
+        <p:spPr>
+          <a:xfrm>
+            <a:off x="10544432" y="5867131"/>
+            <a:ext cx="958591" cy="365125"/>
+          </a:xfrm>
+        </p:spPr>
+        <p:txBody>
+          <a:bodyPr/>
+          <a:lstStyle/>
+          <a:p>
+            <a:r>
+              <a:rPr lang="en-US" sz="1800" dirty="0" smtClean="0"/>
+              <a:t>12 </a:t>
+            </a:r>
+            <a:r>
+              <a:rPr lang="en-US" sz="1800" dirty="0"/>
+              <a:t>/ </a:t>
+            </a:r>
+            <a:r>
+              <a:rPr lang="en-US" sz="1800" dirty="0" smtClean="0"/>
+              <a:t>18</a:t>
+            </a:r>
+            <a:endParaRPr lang="en-US" sz="1800" dirty="0"/>
           </a:p>
         </p:txBody>
       </p:sp>
@@ -7666,27 +7628,24 @@
           <a:bodyPr/>
           <a:lstStyle/>
           <a:p>
-            <a:pPr marL="0" indent="0">
-              <a:buNone/>
-            </a:pPr>
             <a:r>
               <a:rPr lang="fr-FR" dirty="0" smtClean="0"/>
-              <a:t>Choix d’un ensemble de vues cohérentes entre elles pour la visualisation</a:t>
-            </a:r>
-          </a:p>
-          <a:p>
-            <a:pPr marL="0" indent="0">
-              <a:buNone/>
-            </a:pPr>
+              <a:t>Choix d’un ensemble de vues cohérentes entre elles pour la </a:t>
+            </a:r>
+            <a:r>
+              <a:rPr lang="fr-FR" dirty="0" smtClean="0"/>
+              <a:t>visualisation</a:t>
+            </a:r>
             <a:endParaRPr lang="fr-FR" dirty="0"/>
           </a:p>
           <a:p>
-            <a:pPr marL="0" indent="0">
-              <a:buNone/>
-            </a:pPr>
             <a:r>
               <a:rPr lang="fr-FR" dirty="0" smtClean="0"/>
-              <a:t>Prise en main des outils comme </a:t>
+              <a:t>Prise en main des outils </a:t>
+            </a:r>
+            <a:r>
+              <a:rPr lang="fr-FR" dirty="0" smtClean="0"/>
+              <a:t>(</a:t>
             </a:r>
             <a:r>
               <a:rPr lang="fr-FR" dirty="0" err="1" smtClean="0"/>
@@ -7694,7 +7653,11 @@
             </a:r>
             <a:r>
               <a:rPr lang="fr-FR" dirty="0" smtClean="0"/>
-              <a:t> ou </a:t>
+              <a:t> </a:t>
+            </a:r>
+            <a:r>
+              <a:rPr lang="fr-FR" dirty="0" smtClean="0"/>
+              <a:t>ou </a:t>
             </a:r>
             <a:r>
               <a:rPr lang="fr-FR" dirty="0" err="1" smtClean="0"/>
@@ -7702,19 +7665,19 @@
             </a:r>
             <a:r>
               <a:rPr lang="fr-FR" dirty="0" smtClean="0"/>
-              <a:t> à intégrer au logiciel</a:t>
-            </a:r>
-          </a:p>
-          <a:p>
-            <a:pPr marL="0" indent="0">
-              <a:buNone/>
-            </a:pPr>
+              <a:t>) </a:t>
+            </a:r>
+            <a:r>
+              <a:rPr lang="fr-FR" dirty="0" smtClean="0"/>
+              <a:t>à intégrer au </a:t>
+            </a:r>
+            <a:r>
+              <a:rPr lang="fr-FR" dirty="0" smtClean="0"/>
+              <a:t>logiciel</a:t>
+            </a:r>
             <a:endParaRPr lang="fr-FR" dirty="0"/>
           </a:p>
           <a:p>
-            <a:pPr marL="0" indent="0">
-              <a:buNone/>
-            </a:pPr>
             <a:r>
               <a:rPr lang="fr-FR" dirty="0" smtClean="0"/>
               <a:t>Développement du logiciel</a:t>
@@ -7724,29 +7687,6 @@
       </p:sp>
       <p:sp>
         <p:nvSpPr>
-          <p:cNvPr id="4" name="Espace réservé du pied de page 3"/>
-          <p:cNvSpPr>
-            <a:spLocks noGrp="1"/>
-          </p:cNvSpPr>
-          <p:nvPr>
-            <p:ph type="ftr" sz="quarter" idx="11"/>
-          </p:nvPr>
-        </p:nvSpPr>
-        <p:spPr/>
-        <p:txBody>
-          <a:bodyPr/>
-          <a:lstStyle/>
-          <a:p>
-            <a:r>
-              <a:rPr lang="en-US" smtClean="0"/>
-              <a:t>Visualisation de capture réseau</a:t>
-            </a:r>
-            <a:endParaRPr lang="en-US" dirty="0"/>
-          </a:p>
-        </p:txBody>
-      </p:sp>
-      <p:sp>
-        <p:nvSpPr>
           <p:cNvPr id="5" name="Espace réservé du numéro de diapositive 4"/>
           <p:cNvSpPr>
             <a:spLocks noGrp="1"/>
@@ -7755,17 +7695,29 @@
             <p:ph type="sldNum" sz="quarter" idx="12"/>
           </p:nvPr>
         </p:nvSpPr>
-        <p:spPr/>
-        <p:txBody>
-          <a:bodyPr/>
-          <a:lstStyle/>
-          <a:p>
-            <a:fld id="{D57F1E4F-1CFF-5643-939E-217C01CDF565}" type="slidenum">
-              <a:rPr lang="en-US" smtClean="0"/>
-              <a:pPr/>
-              <a:t>13</a:t>
-            </a:fld>
-            <a:endParaRPr lang="en-US" dirty="0"/>
+        <p:spPr>
+          <a:xfrm>
+            <a:off x="10635050" y="5867131"/>
+            <a:ext cx="867974" cy="365125"/>
+          </a:xfrm>
+        </p:spPr>
+        <p:txBody>
+          <a:bodyPr/>
+          <a:lstStyle/>
+          <a:p>
+            <a:r>
+              <a:rPr lang="en-US" sz="1800" dirty="0" smtClean="0"/>
+              <a:t>13 </a:t>
+            </a:r>
+            <a:r>
+              <a:rPr lang="en-US" sz="1800" dirty="0"/>
+              <a:t>/ </a:t>
+            </a:r>
+            <a:r>
+              <a:rPr lang="en-US" sz="1800" dirty="0" smtClean="0"/>
+              <a:t>18</a:t>
+            </a:r>
+            <a:endParaRPr lang="en-US" sz="1800" dirty="0"/>
           </a:p>
         </p:txBody>
       </p:sp>
@@ -7892,29 +7844,6 @@
       </p:sp>
       <p:sp>
         <p:nvSpPr>
-          <p:cNvPr id="4" name="Espace réservé du pied de page 3"/>
-          <p:cNvSpPr>
-            <a:spLocks noGrp="1"/>
-          </p:cNvSpPr>
-          <p:nvPr>
-            <p:ph type="ftr" sz="quarter" idx="11"/>
-          </p:nvPr>
-        </p:nvSpPr>
-        <p:spPr/>
-        <p:txBody>
-          <a:bodyPr/>
-          <a:lstStyle/>
-          <a:p>
-            <a:r>
-              <a:rPr lang="en-US" smtClean="0"/>
-              <a:t>Visualisation de capture réseau</a:t>
-            </a:r>
-            <a:endParaRPr lang="en-US" dirty="0"/>
-          </a:p>
-        </p:txBody>
-      </p:sp>
-      <p:sp>
-        <p:nvSpPr>
           <p:cNvPr id="5" name="Espace réservé du numéro de diapositive 4"/>
           <p:cNvSpPr>
             <a:spLocks noGrp="1"/>
@@ -7923,17 +7852,29 @@
             <p:ph type="sldNum" sz="quarter" idx="12"/>
           </p:nvPr>
         </p:nvSpPr>
-        <p:spPr/>
-        <p:txBody>
-          <a:bodyPr/>
-          <a:lstStyle/>
-          <a:p>
-            <a:fld id="{D57F1E4F-1CFF-5643-939E-217C01CDF565}" type="slidenum">
-              <a:rPr lang="en-US" smtClean="0"/>
-              <a:pPr/>
-              <a:t>14</a:t>
-            </a:fld>
-            <a:endParaRPr lang="en-US" dirty="0"/>
+        <p:spPr>
+          <a:xfrm>
+            <a:off x="10684476" y="5867131"/>
+            <a:ext cx="818547" cy="365125"/>
+          </a:xfrm>
+        </p:spPr>
+        <p:txBody>
+          <a:bodyPr/>
+          <a:lstStyle/>
+          <a:p>
+            <a:r>
+              <a:rPr lang="en-US" sz="1800" dirty="0" smtClean="0"/>
+              <a:t>14 </a:t>
+            </a:r>
+            <a:r>
+              <a:rPr lang="en-US" sz="1800" dirty="0"/>
+              <a:t>/ </a:t>
+            </a:r>
+            <a:r>
+              <a:rPr lang="en-US" sz="1800" dirty="0" smtClean="0"/>
+              <a:t>18</a:t>
+            </a:r>
+            <a:endParaRPr lang="en-US" sz="1800" dirty="0"/>
           </a:p>
         </p:txBody>
       </p:sp>
@@ -8029,23 +7970,27 @@
             </a:r>
             <a:r>
               <a:rPr lang="fr-FR" dirty="0" err="1" smtClean="0"/>
-              <a:t>Scapy</a:t>
+              <a:t>E</a:t>
+            </a:r>
+            <a:r>
+              <a:rPr lang="fr-FR" dirty="0" err="1" smtClean="0"/>
+              <a:t>ttercap</a:t>
             </a:r>
             <a:r>
               <a:rPr lang="fr-FR" dirty="0" smtClean="0"/>
               <a:t>, </a:t>
             </a:r>
             <a:r>
+              <a:rPr lang="fr-FR" dirty="0" err="1"/>
+              <a:t>ChaosReader</a:t>
+            </a:r>
+            <a:r>
+              <a:rPr lang="fr-FR" dirty="0"/>
+              <a:t>, </a:t>
+            </a:r>
+            <a:r>
               <a:rPr lang="fr-FR" dirty="0" err="1" smtClean="0"/>
-              <a:t>ettercap</a:t>
-            </a:r>
-            <a:r>
-              <a:rPr lang="fr-FR" dirty="0" smtClean="0"/>
-              <a:t>, </a:t>
-            </a:r>
-            <a:r>
-              <a:rPr lang="fr-FR" dirty="0" err="1" smtClean="0"/>
-              <a:t>ChaosReader,dsniff</a:t>
+              <a:t>Scapy</a:t>
             </a:r>
             <a:endParaRPr lang="fr-FR" dirty="0" smtClean="0"/>
           </a:p>
@@ -8079,29 +8024,6 @@
       </p:sp>
       <p:sp>
         <p:nvSpPr>
-          <p:cNvPr id="4" name="Espace réservé du pied de page 3"/>
-          <p:cNvSpPr>
-            <a:spLocks noGrp="1"/>
-          </p:cNvSpPr>
-          <p:nvPr>
-            <p:ph type="ftr" sz="quarter" idx="11"/>
-          </p:nvPr>
-        </p:nvSpPr>
-        <p:spPr/>
-        <p:txBody>
-          <a:bodyPr/>
-          <a:lstStyle/>
-          <a:p>
-            <a:r>
-              <a:rPr lang="en-US" smtClean="0"/>
-              <a:t>Visualisation de capture réseau</a:t>
-            </a:r>
-            <a:endParaRPr lang="en-US" dirty="0"/>
-          </a:p>
-        </p:txBody>
-      </p:sp>
-      <p:sp>
-        <p:nvSpPr>
           <p:cNvPr id="5" name="Espace réservé du numéro de diapositive 4"/>
           <p:cNvSpPr>
             <a:spLocks noGrp="1"/>
@@ -8110,17 +8032,21 @@
             <p:ph type="sldNum" sz="quarter" idx="12"/>
           </p:nvPr>
         </p:nvSpPr>
-        <p:spPr/>
-        <p:txBody>
-          <a:bodyPr/>
-          <a:lstStyle/>
-          <a:p>
-            <a:fld id="{D57F1E4F-1CFF-5643-939E-217C01CDF565}" type="slidenum">
-              <a:rPr lang="en-US" smtClean="0"/>
-              <a:pPr/>
-              <a:t>15</a:t>
-            </a:fld>
-            <a:endParaRPr lang="en-US" dirty="0"/>
+        <p:spPr>
+          <a:xfrm>
+            <a:off x="10470292" y="5867131"/>
+            <a:ext cx="1032731" cy="365125"/>
+          </a:xfrm>
+        </p:spPr>
+        <p:txBody>
+          <a:bodyPr/>
+          <a:lstStyle/>
+          <a:p>
+            <a:r>
+              <a:rPr lang="en-US" sz="1800" dirty="0" smtClean="0"/>
+              <a:t>15 / 18</a:t>
+            </a:r>
+            <a:endParaRPr lang="en-US" sz="1800" dirty="0"/>
           </a:p>
         </p:txBody>
       </p:sp>
@@ -8171,7 +8097,12 @@
             <p:ph type="title"/>
           </p:nvPr>
         </p:nvSpPr>
-        <p:spPr/>
+        <p:spPr>
+          <a:xfrm>
+            <a:off x="1484310" y="-113270"/>
+            <a:ext cx="10018713" cy="1752599"/>
+          </a:xfrm>
+        </p:spPr>
         <p:txBody>
           <a:bodyPr/>
           <a:lstStyle/>
@@ -8184,48 +8115,35 @@
           </a:p>
         </p:txBody>
       </p:sp>
-      <p:sp>
-        <p:nvSpPr>
-          <p:cNvPr id="3" name="Espace réservé du contenu 2"/>
-          <p:cNvSpPr>
-            <a:spLocks noGrp="1"/>
-          </p:cNvSpPr>
+      <p:pic>
+        <p:nvPicPr>
+          <p:cNvPr id="6" name="Espace réservé du contenu 5"/>
+          <p:cNvPicPr>
+            <a:picLocks noGrp="1" noChangeAspect="1"/>
+          </p:cNvPicPr>
           <p:nvPr>
             <p:ph idx="1"/>
           </p:nvPr>
-        </p:nvSpPr>
-        <p:spPr/>
-        <p:txBody>
-          <a:bodyPr/>
-          <a:lstStyle/>
-          <a:p>
-            <a:endParaRPr lang="fr-FR"/>
-          </a:p>
-        </p:txBody>
-      </p:sp>
-      <p:sp>
-        <p:nvSpPr>
-          <p:cNvPr id="4" name="Espace réservé du pied de page 3"/>
-          <p:cNvSpPr>
-            <a:spLocks noGrp="1"/>
-          </p:cNvSpPr>
-          <p:nvPr>
-            <p:ph type="ftr" sz="quarter" idx="11"/>
-          </p:nvPr>
-        </p:nvSpPr>
-        <p:spPr/>
-        <p:txBody>
-          <a:bodyPr/>
-          <a:lstStyle/>
-          <a:p>
-            <a:r>
-              <a:rPr lang="en-US" smtClean="0"/>
-              <a:t>Visualisation de capture réseau</a:t>
-            </a:r>
-            <a:endParaRPr lang="en-US" dirty="0"/>
-          </a:p>
-        </p:txBody>
-      </p:sp>
+        </p:nvPicPr>
+        <p:blipFill>
+          <a:blip r:embed="rId2">
+            <a:extLst>
+              <a:ext uri="{28A0092B-C50C-407E-A947-70E740481C1C}">
+                <a14:useLocalDpi xmlns:a14="http://schemas.microsoft.com/office/drawing/2010/main" val="0"/>
+              </a:ext>
+            </a:extLst>
+          </a:blip>
+          <a:stretch>
+            <a:fillRect/>
+          </a:stretch>
+        </p:blipFill>
+        <p:spPr>
+          <a:xfrm>
+            <a:off x="3421227" y="1369272"/>
+            <a:ext cx="6144877" cy="4497859"/>
+          </a:xfrm>
+        </p:spPr>
+      </p:pic>
       <p:sp>
         <p:nvSpPr>
           <p:cNvPr id="5" name="Espace réservé du numéro de diapositive 4"/>
@@ -8236,17 +8154,29 @@
             <p:ph type="sldNum" sz="quarter" idx="12"/>
           </p:nvPr>
         </p:nvSpPr>
-        <p:spPr/>
-        <p:txBody>
-          <a:bodyPr/>
-          <a:lstStyle/>
-          <a:p>
-            <a:fld id="{D57F1E4F-1CFF-5643-939E-217C01CDF565}" type="slidenum">
-              <a:rPr lang="en-US" smtClean="0"/>
-              <a:pPr/>
-              <a:t>16</a:t>
-            </a:fld>
-            <a:endParaRPr lang="en-US" dirty="0"/>
+        <p:spPr>
+          <a:xfrm>
+            <a:off x="10635050" y="5867131"/>
+            <a:ext cx="867974" cy="365125"/>
+          </a:xfrm>
+        </p:spPr>
+        <p:txBody>
+          <a:bodyPr/>
+          <a:lstStyle/>
+          <a:p>
+            <a:r>
+              <a:rPr lang="en-US" sz="1800" dirty="0" smtClean="0"/>
+              <a:t>16 </a:t>
+            </a:r>
+            <a:r>
+              <a:rPr lang="en-US" sz="1800" dirty="0"/>
+              <a:t>/ </a:t>
+            </a:r>
+            <a:r>
+              <a:rPr lang="en-US" sz="1800" dirty="0" smtClean="0"/>
+              <a:t>18</a:t>
+            </a:r>
+            <a:endParaRPr lang="en-US" sz="1800" dirty="0"/>
           </a:p>
         </p:txBody>
       </p:sp>
@@ -8294,6 +8224,136 @@
             <a:spLocks noGrp="1"/>
           </p:cNvSpPr>
           <p:nvPr>
+            <p:ph type="title"/>
+          </p:nvPr>
+        </p:nvSpPr>
+        <p:spPr>
+          <a:xfrm>
+            <a:off x="1484310" y="-113270"/>
+            <a:ext cx="10018713" cy="1752599"/>
+          </a:xfrm>
+        </p:spPr>
+        <p:txBody>
+          <a:bodyPr/>
+          <a:lstStyle/>
+          <a:p>
+            <a:r>
+              <a:rPr lang="fr-FR" dirty="0" smtClean="0"/>
+              <a:t>Design</a:t>
+            </a:r>
+            <a:endParaRPr lang="fr-FR" dirty="0"/>
+          </a:p>
+        </p:txBody>
+      </p:sp>
+      <p:sp>
+        <p:nvSpPr>
+          <p:cNvPr id="5" name="Espace réservé du numéro de diapositive 4"/>
+          <p:cNvSpPr>
+            <a:spLocks noGrp="1"/>
+          </p:cNvSpPr>
+          <p:nvPr>
+            <p:ph type="sldNum" sz="quarter" idx="12"/>
+          </p:nvPr>
+        </p:nvSpPr>
+        <p:spPr>
+          <a:xfrm>
+            <a:off x="10659762" y="5867131"/>
+            <a:ext cx="843261" cy="365125"/>
+          </a:xfrm>
+        </p:spPr>
+        <p:txBody>
+          <a:bodyPr/>
+          <a:lstStyle/>
+          <a:p>
+            <a:r>
+              <a:rPr lang="en-US" sz="1800" dirty="0" smtClean="0"/>
+              <a:t>17 </a:t>
+            </a:r>
+            <a:r>
+              <a:rPr lang="en-US" sz="1800" dirty="0"/>
+              <a:t>/ </a:t>
+            </a:r>
+            <a:r>
+              <a:rPr lang="en-US" sz="1800" dirty="0" smtClean="0"/>
+              <a:t>18</a:t>
+            </a:r>
+            <a:endParaRPr lang="en-US" sz="1800" dirty="0"/>
+          </a:p>
+        </p:txBody>
+      </p:sp>
+      <p:pic>
+        <p:nvPicPr>
+          <p:cNvPr id="7" name="Espace réservé du contenu 6"/>
+          <p:cNvPicPr>
+            <a:picLocks noGrp="1" noChangeAspect="1"/>
+          </p:cNvPicPr>
+          <p:nvPr>
+            <p:ph idx="1"/>
+          </p:nvPr>
+        </p:nvPicPr>
+        <p:blipFill>
+          <a:blip r:embed="rId2">
+            <a:extLst>
+              <a:ext uri="{28A0092B-C50C-407E-A947-70E740481C1C}">
+                <a14:useLocalDpi xmlns:a14="http://schemas.microsoft.com/office/drawing/2010/main" val="0"/>
+              </a:ext>
+            </a:extLst>
+          </a:blip>
+          <a:stretch>
+            <a:fillRect/>
+          </a:stretch>
+        </p:blipFill>
+        <p:spPr>
+          <a:xfrm>
+            <a:off x="3296948" y="1273788"/>
+            <a:ext cx="6261627" cy="4583317"/>
+          </a:xfrm>
+        </p:spPr>
+      </p:pic>
+    </p:spTree>
+    <p:extLst>
+      <p:ext uri="{BB962C8B-B14F-4D97-AF65-F5344CB8AC3E}">
+        <p14:creationId xmlns:p14="http://schemas.microsoft.com/office/powerpoint/2010/main" val="3473796164"/>
+      </p:ext>
+    </p:extLst>
+  </p:cSld>
+  <p:clrMapOvr>
+    <a:masterClrMapping/>
+  </p:clrMapOvr>
+  <p:timing>
+    <p:tnLst>
+      <p:par>
+        <p:cTn id="1" dur="indefinite" restart="never" nodeType="tmRoot"/>
+      </p:par>
+    </p:tnLst>
+  </p:timing>
+</p:sld>
+</file>
+
+<file path=ppt/slides/slide18.xml><?xml version="1.0" encoding="utf-8"?>
+<p:sld xmlns:a="http://schemas.openxmlformats.org/drawingml/2006/main" xmlns:r="http://schemas.openxmlformats.org/officeDocument/2006/relationships" xmlns:p="http://schemas.openxmlformats.org/presentationml/2006/main">
+  <p:cSld>
+    <p:spTree>
+      <p:nvGrpSpPr>
+        <p:cNvPr id="1" name=""/>
+        <p:cNvGrpSpPr/>
+        <p:nvPr/>
+      </p:nvGrpSpPr>
+      <p:grpSpPr>
+        <a:xfrm>
+          <a:off x="0" y="0"/>
+          <a:ext cx="0" cy="0"/>
+          <a:chOff x="0" y="0"/>
+          <a:chExt cx="0" cy="0"/>
+        </a:xfrm>
+      </p:grpSpPr>
+      <p:sp>
+        <p:nvSpPr>
+          <p:cNvPr id="2" name="Titre 1"/>
+          <p:cNvSpPr>
+            <a:spLocks noGrp="1"/>
+          </p:cNvSpPr>
+          <p:nvPr>
             <p:ph type="ctrTitle"/>
           </p:nvPr>
         </p:nvSpPr>
@@ -8320,17 +8380,29 @@
             <p:ph type="sldNum" sz="quarter" idx="12"/>
           </p:nvPr>
         </p:nvSpPr>
-        <p:spPr/>
-        <p:txBody>
-          <a:bodyPr/>
-          <a:lstStyle/>
-          <a:p>
-            <a:fld id="{D57F1E4F-1CFF-5643-939E-217C01CDF565}" type="slidenum">
-              <a:rPr lang="en-US" smtClean="0"/>
-              <a:pPr/>
-              <a:t>17</a:t>
-            </a:fld>
-            <a:endParaRPr lang="en-US" dirty="0"/>
+        <p:spPr>
+          <a:xfrm>
+            <a:off x="10668000" y="5883275"/>
+            <a:ext cx="835023" cy="365125"/>
+          </a:xfrm>
+        </p:spPr>
+        <p:txBody>
+          <a:bodyPr/>
+          <a:lstStyle/>
+          <a:p>
+            <a:r>
+              <a:rPr lang="en-US" sz="1800" dirty="0" smtClean="0"/>
+              <a:t>18 </a:t>
+            </a:r>
+            <a:r>
+              <a:rPr lang="en-US" sz="1800" dirty="0"/>
+              <a:t>/ </a:t>
+            </a:r>
+            <a:r>
+              <a:rPr lang="en-US" sz="1800" dirty="0" smtClean="0"/>
+              <a:t>18</a:t>
+            </a:r>
+            <a:endParaRPr lang="en-US" sz="1800" dirty="0"/>
           </a:p>
         </p:txBody>
       </p:sp>
@@ -8415,7 +8487,11 @@
             </a:pPr>
             <a:r>
               <a:rPr lang="fr-FR" dirty="0" smtClean="0"/>
-              <a:t>Présentation Générale</a:t>
+              <a:t>Présentation </a:t>
+            </a:r>
+            <a:r>
+              <a:rPr lang="fr-FR" dirty="0" smtClean="0"/>
+              <a:t>Générale</a:t>
             </a:r>
           </a:p>
           <a:p>
@@ -8424,9 +8500,14 @@
               <a:buAutoNum type="arabicPeriod"/>
             </a:pPr>
             <a:r>
+              <a:rPr lang="fr-FR" dirty="0"/>
+              <a:t>Etat de </a:t>
+            </a:r>
+            <a:r>
               <a:rPr lang="fr-FR" dirty="0" smtClean="0"/>
-              <a:t>Spécifications</a:t>
-            </a:r>
+              <a:t>l’art</a:t>
+            </a:r>
+            <a:endParaRPr lang="fr-FR" dirty="0" smtClean="0"/>
           </a:p>
           <a:p>
             <a:pPr marL="457200" indent="-457200">
@@ -8435,8 +8516,9 @@
             </a:pPr>
             <a:r>
               <a:rPr lang="fr-FR" dirty="0" smtClean="0"/>
-              <a:t>Etat de l’art</a:t>
-            </a:r>
+              <a:t>Spécifications</a:t>
+            </a:r>
+            <a:endParaRPr lang="fr-FR" dirty="0" smtClean="0"/>
           </a:p>
           <a:p>
             <a:pPr marL="457200" indent="-457200">
@@ -8445,7 +8527,11 @@
             </a:pPr>
             <a:r>
               <a:rPr lang="fr-FR" dirty="0" smtClean="0"/>
-              <a:t>Solutions choisies</a:t>
+              <a:t>Solutions </a:t>
+            </a:r>
+            <a:r>
+              <a:rPr lang="fr-FR" dirty="0" smtClean="0"/>
+              <a:t>choisies</a:t>
             </a:r>
             <a:endParaRPr lang="fr-FR" dirty="0"/>
           </a:p>
@@ -8453,29 +8539,6 @@
       </p:sp>
       <p:sp>
         <p:nvSpPr>
-          <p:cNvPr id="4" name="Espace réservé du pied de page 3"/>
-          <p:cNvSpPr>
-            <a:spLocks noGrp="1"/>
-          </p:cNvSpPr>
-          <p:nvPr>
-            <p:ph type="ftr" sz="quarter" idx="11"/>
-          </p:nvPr>
-        </p:nvSpPr>
-        <p:spPr/>
-        <p:txBody>
-          <a:bodyPr/>
-          <a:lstStyle/>
-          <a:p>
-            <a:r>
-              <a:rPr lang="en-US" smtClean="0"/>
-              <a:t>Visualisation de capture réseau</a:t>
-            </a:r>
-            <a:endParaRPr lang="en-US" dirty="0"/>
-          </a:p>
-        </p:txBody>
-      </p:sp>
-      <p:sp>
-        <p:nvSpPr>
           <p:cNvPr id="5" name="Espace réservé du numéro de diapositive 4"/>
           <p:cNvSpPr>
             <a:spLocks noGrp="1"/>
@@ -8484,17 +8547,27 @@
             <p:ph type="sldNum" sz="quarter" idx="12"/>
           </p:nvPr>
         </p:nvSpPr>
-        <p:spPr/>
-        <p:txBody>
-          <a:bodyPr/>
-          <a:lstStyle/>
-          <a:p>
-            <a:fld id="{D57F1E4F-1CFF-5643-939E-217C01CDF565}" type="slidenum">
-              <a:rPr lang="en-US" smtClean="0"/>
-              <a:pPr/>
-              <a:t>2</a:t>
-            </a:fld>
-            <a:endParaRPr lang="en-US" dirty="0"/>
+        <p:spPr>
+          <a:xfrm>
+            <a:off x="10733904" y="5791201"/>
+            <a:ext cx="769120" cy="774356"/>
+          </a:xfrm>
+        </p:spPr>
+        <p:txBody>
+          <a:bodyPr/>
+          <a:lstStyle/>
+          <a:p>
+            <a:r>
+              <a:rPr lang="en-US" sz="1800" dirty="0" smtClean="0"/>
+              <a:t>2 / </a:t>
+            </a:r>
+            <a:r>
+              <a:rPr lang="en-US" sz="1800" dirty="0"/>
+              <a:t>18</a:t>
+            </a:r>
+          </a:p>
+          <a:p>
+            <a:endParaRPr lang="en-US" sz="1800" dirty="0"/>
           </a:p>
         </p:txBody>
       </p:sp>
@@ -8612,40 +8685,27 @@
             <p:ph type="sldNum" sz="quarter" idx="12"/>
           </p:nvPr>
         </p:nvSpPr>
-        <p:spPr/>
-        <p:txBody>
-          <a:bodyPr/>
-          <a:lstStyle/>
-          <a:p>
-            <a:fld id="{D57F1E4F-1CFF-5643-939E-217C01CDF565}" type="slidenum">
-              <a:rPr lang="en-US" smtClean="0"/>
-              <a:pPr/>
-              <a:t>3</a:t>
-            </a:fld>
-            <a:endParaRPr lang="en-US" dirty="0"/>
-          </a:p>
-        </p:txBody>
-      </p:sp>
-      <p:sp>
-        <p:nvSpPr>
-          <p:cNvPr id="5" name="Espace réservé du pied de page 4"/>
-          <p:cNvSpPr>
-            <a:spLocks noGrp="1"/>
-          </p:cNvSpPr>
-          <p:nvPr>
-            <p:ph type="ftr" sz="quarter" idx="11"/>
-          </p:nvPr>
-        </p:nvSpPr>
-        <p:spPr/>
-        <p:txBody>
-          <a:bodyPr/>
-          <a:lstStyle/>
-          <a:p>
-            <a:r>
-              <a:rPr lang="en-US" smtClean="0"/>
-              <a:t>Visualisation de capture réseau</a:t>
-            </a:r>
-            <a:endParaRPr lang="en-US" dirty="0"/>
+        <p:spPr>
+          <a:xfrm>
+            <a:off x="10791568" y="5867130"/>
+            <a:ext cx="711455" cy="640761"/>
+          </a:xfrm>
+        </p:spPr>
+        <p:txBody>
+          <a:bodyPr/>
+          <a:lstStyle/>
+          <a:p>
+            <a:r>
+              <a:rPr lang="en-US" sz="1800" dirty="0" smtClean="0"/>
+              <a:t>3 / </a:t>
+            </a:r>
+            <a:r>
+              <a:rPr lang="en-US" sz="1800" dirty="0"/>
+              <a:t>18</a:t>
+            </a:r>
+          </a:p>
+          <a:p>
+            <a:endParaRPr lang="en-US" sz="1800" dirty="0"/>
           </a:p>
         </p:txBody>
       </p:sp>
@@ -8782,40 +8842,21 @@
             <p:ph type="sldNum" sz="quarter" idx="12"/>
           </p:nvPr>
         </p:nvSpPr>
-        <p:spPr/>
-        <p:txBody>
-          <a:bodyPr/>
-          <a:lstStyle/>
-          <a:p>
-            <a:fld id="{D57F1E4F-1CFF-5643-939E-217C01CDF565}" type="slidenum">
-              <a:rPr lang="en-US" smtClean="0"/>
-              <a:pPr/>
-              <a:t>4</a:t>
-            </a:fld>
-            <a:endParaRPr lang="en-US" dirty="0"/>
-          </a:p>
-        </p:txBody>
-      </p:sp>
-      <p:sp>
-        <p:nvSpPr>
-          <p:cNvPr id="5" name="Espace réservé du pied de page 4"/>
-          <p:cNvSpPr>
-            <a:spLocks noGrp="1"/>
-          </p:cNvSpPr>
-          <p:nvPr>
-            <p:ph type="ftr" sz="quarter" idx="11"/>
-          </p:nvPr>
-        </p:nvSpPr>
-        <p:spPr/>
-        <p:txBody>
-          <a:bodyPr/>
-          <a:lstStyle/>
-          <a:p>
-            <a:r>
-              <a:rPr lang="en-US" smtClean="0"/>
-              <a:t>Visualisation de capture réseau</a:t>
-            </a:r>
-            <a:endParaRPr lang="en-US" dirty="0"/>
+        <p:spPr>
+          <a:xfrm>
+            <a:off x="10750378" y="5867131"/>
+            <a:ext cx="752645" cy="525431"/>
+          </a:xfrm>
+        </p:spPr>
+        <p:txBody>
+          <a:bodyPr/>
+          <a:lstStyle/>
+          <a:p>
+            <a:r>
+              <a:rPr lang="en-US" sz="1800" dirty="0" smtClean="0"/>
+              <a:t>4 / 18</a:t>
+            </a:r>
+            <a:endParaRPr lang="en-US" sz="1800" dirty="0"/>
           </a:p>
         </p:txBody>
       </p:sp>
@@ -8954,40 +8995,27 @@
             <p:ph type="sldNum" sz="quarter" idx="12"/>
           </p:nvPr>
         </p:nvSpPr>
-        <p:spPr/>
-        <p:txBody>
-          <a:bodyPr/>
-          <a:lstStyle/>
-          <a:p>
-            <a:fld id="{D57F1E4F-1CFF-5643-939E-217C01CDF565}" type="slidenum">
-              <a:rPr lang="en-US" smtClean="0"/>
-              <a:pPr/>
-              <a:t>5</a:t>
-            </a:fld>
-            <a:endParaRPr lang="en-US" dirty="0"/>
-          </a:p>
-        </p:txBody>
-      </p:sp>
-      <p:sp>
-        <p:nvSpPr>
-          <p:cNvPr id="5" name="Espace réservé du pied de page 4"/>
-          <p:cNvSpPr>
-            <a:spLocks noGrp="1"/>
-          </p:cNvSpPr>
-          <p:nvPr>
-            <p:ph type="ftr" sz="quarter" idx="11"/>
-          </p:nvPr>
-        </p:nvSpPr>
-        <p:spPr/>
-        <p:txBody>
-          <a:bodyPr/>
-          <a:lstStyle/>
-          <a:p>
-            <a:r>
-              <a:rPr lang="en-US" smtClean="0"/>
-              <a:t>Visualisation de capture réseau</a:t>
-            </a:r>
-            <a:endParaRPr lang="en-US" dirty="0"/>
+        <p:spPr>
+          <a:xfrm>
+            <a:off x="10791568" y="5867131"/>
+            <a:ext cx="711455" cy="492480"/>
+          </a:xfrm>
+        </p:spPr>
+        <p:txBody>
+          <a:bodyPr/>
+          <a:lstStyle/>
+          <a:p>
+            <a:r>
+              <a:rPr lang="en-US" sz="1800" dirty="0" smtClean="0"/>
+              <a:t>5 </a:t>
+            </a:r>
+            <a:r>
+              <a:rPr lang="en-US" sz="1800" dirty="0"/>
+              <a:t>/ 18</a:t>
+            </a:r>
+          </a:p>
+          <a:p>
+            <a:endParaRPr lang="en-US" sz="1800" dirty="0"/>
           </a:p>
         </p:txBody>
       </p:sp>
@@ -9061,48 +9089,25 @@
             <p:ph type="sldNum" sz="quarter" idx="12"/>
           </p:nvPr>
         </p:nvSpPr>
-        <p:spPr/>
-        <p:txBody>
-          <a:bodyPr/>
-          <a:lstStyle/>
-          <a:p>
-            <a:fld id="{D57F1E4F-1CFF-5643-939E-217C01CDF565}" type="slidenum">
-              <a:rPr lang="en-US" smtClean="0"/>
-              <a:pPr/>
+        <p:spPr>
+          <a:xfrm>
+            <a:off x="10791568" y="5867131"/>
+            <a:ext cx="711455" cy="459528"/>
+          </a:xfrm>
+        </p:spPr>
+        <p:txBody>
+          <a:bodyPr/>
+          <a:lstStyle/>
+          <a:p>
+            <a:r>
+              <a:rPr lang="en-US" sz="1800" dirty="0"/>
               <a:t>6</a:t>
-            </a:fld>
-            <a:endParaRPr lang="en-US" dirty="0"/>
-          </a:p>
-        </p:txBody>
-      </p:sp>
-      <p:sp>
-        <p:nvSpPr>
-          <p:cNvPr id="5" name="Espace réservé du pied de page 4"/>
-          <p:cNvSpPr>
-            <a:spLocks noGrp="1"/>
-          </p:cNvSpPr>
-          <p:nvPr>
-            <p:ph type="ftr" sz="quarter" idx="11"/>
-          </p:nvPr>
-        </p:nvSpPr>
-        <p:spPr/>
-        <p:txBody>
-          <a:bodyPr/>
-          <a:lstStyle/>
-          <a:p>
-            <a:r>
-              <a:rPr lang="en-US" dirty="0" err="1" smtClean="0"/>
-              <a:t>Visualisation</a:t>
-            </a:r>
-            <a:r>
-              <a:rPr lang="en-US" dirty="0" smtClean="0"/>
-              <a:t> de capture </a:t>
-            </a:r>
-            <a:r>
-              <a:rPr lang="en-US" dirty="0" err="1" smtClean="0"/>
-              <a:t>réseau</a:t>
-            </a:r>
-            <a:endParaRPr lang="en-US" dirty="0"/>
+            </a:r>
+            <a:r>
+              <a:rPr lang="en-US" sz="1800" dirty="0" smtClean="0"/>
+              <a:t> / 18</a:t>
+            </a:r>
+            <a:endParaRPr lang="en-US" sz="1800" dirty="0"/>
           </a:p>
         </p:txBody>
       </p:sp>
@@ -9202,29 +9207,6 @@
       </p:sp>
       <p:sp>
         <p:nvSpPr>
-          <p:cNvPr id="4" name="Espace réservé du pied de page 3"/>
-          <p:cNvSpPr>
-            <a:spLocks noGrp="1"/>
-          </p:cNvSpPr>
-          <p:nvPr>
-            <p:ph type="ftr" sz="quarter" idx="11"/>
-          </p:nvPr>
-        </p:nvSpPr>
-        <p:spPr/>
-        <p:txBody>
-          <a:bodyPr/>
-          <a:lstStyle/>
-          <a:p>
-            <a:r>
-              <a:rPr lang="en-US" smtClean="0"/>
-              <a:t>Visualisation de capture réseau</a:t>
-            </a:r>
-            <a:endParaRPr lang="en-US" dirty="0"/>
-          </a:p>
-        </p:txBody>
-      </p:sp>
-      <p:sp>
-        <p:nvSpPr>
           <p:cNvPr id="5" name="Espace réservé du numéro de diapositive 4"/>
           <p:cNvSpPr>
             <a:spLocks noGrp="1"/>
@@ -9233,17 +9215,29 @@
             <p:ph type="sldNum" sz="quarter" idx="12"/>
           </p:nvPr>
         </p:nvSpPr>
-        <p:spPr/>
-        <p:txBody>
-          <a:bodyPr/>
-          <a:lstStyle/>
-          <a:p>
-            <a:fld id="{D57F1E4F-1CFF-5643-939E-217C01CDF565}" type="slidenum">
-              <a:rPr lang="en-US" smtClean="0"/>
-              <a:pPr/>
-              <a:t>7</a:t>
-            </a:fld>
-            <a:endParaRPr lang="en-US" dirty="0"/>
+        <p:spPr>
+          <a:xfrm>
+            <a:off x="10783330" y="5867131"/>
+            <a:ext cx="719693" cy="335961"/>
+          </a:xfrm>
+        </p:spPr>
+        <p:txBody>
+          <a:bodyPr/>
+          <a:lstStyle/>
+          <a:p>
+            <a:r>
+              <a:rPr lang="en-US" sz="1800" dirty="0" smtClean="0"/>
+              <a:t>7 </a:t>
+            </a:r>
+            <a:r>
+              <a:rPr lang="en-US" sz="1800" dirty="0"/>
+              <a:t>/ </a:t>
+            </a:r>
+            <a:r>
+              <a:rPr lang="en-US" sz="1800" dirty="0" smtClean="0"/>
+              <a:t>18</a:t>
+            </a:r>
+            <a:endParaRPr lang="en-US" sz="1800" dirty="0"/>
           </a:p>
         </p:txBody>
       </p:sp>
@@ -9433,29 +9427,6 @@
       </p:pic>
       <p:sp>
         <p:nvSpPr>
-          <p:cNvPr id="4" name="Espace réservé du pied de page 3"/>
-          <p:cNvSpPr>
-            <a:spLocks noGrp="1"/>
-          </p:cNvSpPr>
-          <p:nvPr>
-            <p:ph type="ftr" sz="quarter" idx="11"/>
-          </p:nvPr>
-        </p:nvSpPr>
-        <p:spPr/>
-        <p:txBody>
-          <a:bodyPr/>
-          <a:lstStyle/>
-          <a:p>
-            <a:r>
-              <a:rPr lang="en-US" smtClean="0"/>
-              <a:t>Visualisation de capture réseau</a:t>
-            </a:r>
-            <a:endParaRPr lang="en-US" dirty="0"/>
-          </a:p>
-        </p:txBody>
-      </p:sp>
-      <p:sp>
-        <p:nvSpPr>
           <p:cNvPr id="5" name="Espace réservé du numéro de diapositive 4"/>
           <p:cNvSpPr>
             <a:spLocks noGrp="1"/>
@@ -9464,17 +9435,29 @@
             <p:ph type="sldNum" sz="quarter" idx="12"/>
           </p:nvPr>
         </p:nvSpPr>
-        <p:spPr/>
-        <p:txBody>
-          <a:bodyPr/>
-          <a:lstStyle/>
-          <a:p>
-            <a:fld id="{D57F1E4F-1CFF-5643-939E-217C01CDF565}" type="slidenum">
-              <a:rPr lang="en-US" smtClean="0"/>
-              <a:pPr/>
-              <a:t>8</a:t>
-            </a:fld>
-            <a:endParaRPr lang="en-US" dirty="0"/>
+        <p:spPr>
+          <a:xfrm>
+            <a:off x="10824520" y="5867132"/>
+            <a:ext cx="678504" cy="368912"/>
+          </a:xfrm>
+        </p:spPr>
+        <p:txBody>
+          <a:bodyPr/>
+          <a:lstStyle/>
+          <a:p>
+            <a:r>
+              <a:rPr lang="en-US" sz="1800" dirty="0" smtClean="0"/>
+              <a:t>8 </a:t>
+            </a:r>
+            <a:r>
+              <a:rPr lang="en-US" sz="1800" dirty="0"/>
+              <a:t>/ </a:t>
+            </a:r>
+            <a:r>
+              <a:rPr lang="en-US" sz="1800" dirty="0" smtClean="0"/>
+              <a:t>18</a:t>
+            </a:r>
+            <a:endParaRPr lang="en-US" sz="1800" dirty="0"/>
           </a:p>
         </p:txBody>
       </p:sp>
@@ -9604,29 +9587,6 @@
       </p:sp>
       <p:sp>
         <p:nvSpPr>
-          <p:cNvPr id="4" name="Espace réservé du pied de page 3"/>
-          <p:cNvSpPr>
-            <a:spLocks noGrp="1"/>
-          </p:cNvSpPr>
-          <p:nvPr>
-            <p:ph type="ftr" sz="quarter" idx="11"/>
-          </p:nvPr>
-        </p:nvSpPr>
-        <p:spPr/>
-        <p:txBody>
-          <a:bodyPr/>
-          <a:lstStyle/>
-          <a:p>
-            <a:r>
-              <a:rPr lang="en-US" smtClean="0"/>
-              <a:t>Visualisation de capture réseau</a:t>
-            </a:r>
-            <a:endParaRPr lang="en-US" dirty="0"/>
-          </a:p>
-        </p:txBody>
-      </p:sp>
-      <p:sp>
-        <p:nvSpPr>
           <p:cNvPr id="5" name="Espace réservé du numéro de diapositive 4"/>
           <p:cNvSpPr>
             <a:spLocks noGrp="1"/>
@@ -9635,17 +9595,24 @@
             <p:ph type="sldNum" sz="quarter" idx="12"/>
           </p:nvPr>
         </p:nvSpPr>
-        <p:spPr/>
-        <p:txBody>
-          <a:bodyPr/>
-          <a:lstStyle/>
-          <a:p>
-            <a:fld id="{D57F1E4F-1CFF-5643-939E-217C01CDF565}" type="slidenum">
-              <a:rPr lang="en-US" smtClean="0"/>
-              <a:pPr/>
+        <p:spPr>
+          <a:xfrm>
+            <a:off x="10560908" y="5867131"/>
+            <a:ext cx="942116" cy="344199"/>
+          </a:xfrm>
+        </p:spPr>
+        <p:txBody>
+          <a:bodyPr/>
+          <a:lstStyle/>
+          <a:p>
+            <a:r>
+              <a:rPr lang="en-US" sz="1800" dirty="0"/>
               <a:t>9</a:t>
-            </a:fld>
-            <a:endParaRPr lang="en-US" dirty="0"/>
+            </a:r>
+            <a:r>
+              <a:rPr lang="en-US" sz="1800" dirty="0" smtClean="0"/>
+              <a:t> / 18</a:t>
+            </a:r>
           </a:p>
         </p:txBody>
       </p:sp>

</xml_diff>